<commit_message>
working on Fisher information.
</commit_message>
<xml_diff>
--- a/ppt/AIR_transitions.pptx
+++ b/ppt/AIR_transitions.pptx
@@ -5,7 +5,7 @@
     <p:sldMasterId id="2147483648" r:id="rId1"/>
   </p:sldMasterIdLst>
   <p:sldIdLst>
-    <p:sldId id="259" r:id="rId2"/>
+    <p:sldId id="260" r:id="rId2"/>
   </p:sldIdLst>
   <p:sldSz cx="9144000" cy="6858000" type="screen4x3"/>
   <p:notesSz cx="6858000" cy="9144000"/>
@@ -305,7 +305,7 @@
             <a:fld id="{1D8BD707-D9CF-40AE-B4C6-C98DA3205C09}" type="datetimeFigureOut">
               <a:rPr lang="en-US" smtClean="0"/>
               <a:pPr/>
-              <a:t>4/30/2015</a:t>
+              <a:t>5/1/2015</a:t>
             </a:fld>
             <a:endParaRPr lang="en-US"/>
           </a:p>
@@ -472,7 +472,7 @@
             <a:fld id="{1D8BD707-D9CF-40AE-B4C6-C98DA3205C09}" type="datetimeFigureOut">
               <a:rPr lang="en-US" smtClean="0"/>
               <a:pPr/>
-              <a:t>4/30/2015</a:t>
+              <a:t>5/1/2015</a:t>
             </a:fld>
             <a:endParaRPr lang="en-US"/>
           </a:p>
@@ -649,7 +649,7 @@
             <a:fld id="{1D8BD707-D9CF-40AE-B4C6-C98DA3205C09}" type="datetimeFigureOut">
               <a:rPr lang="en-US" smtClean="0"/>
               <a:pPr/>
-              <a:t>4/30/2015</a:t>
+              <a:t>5/1/2015</a:t>
             </a:fld>
             <a:endParaRPr lang="en-US"/>
           </a:p>
@@ -816,7 +816,7 @@
             <a:fld id="{1D8BD707-D9CF-40AE-B4C6-C98DA3205C09}" type="datetimeFigureOut">
               <a:rPr lang="en-US" smtClean="0"/>
               <a:pPr/>
-              <a:t>4/30/2015</a:t>
+              <a:t>5/1/2015</a:t>
             </a:fld>
             <a:endParaRPr lang="en-US"/>
           </a:p>
@@ -1059,7 +1059,7 @@
             <a:fld id="{1D8BD707-D9CF-40AE-B4C6-C98DA3205C09}" type="datetimeFigureOut">
               <a:rPr lang="en-US" smtClean="0"/>
               <a:pPr/>
-              <a:t>4/30/2015</a:t>
+              <a:t>5/1/2015</a:t>
             </a:fld>
             <a:endParaRPr lang="en-US"/>
           </a:p>
@@ -1344,7 +1344,7 @@
             <a:fld id="{1D8BD707-D9CF-40AE-B4C6-C98DA3205C09}" type="datetimeFigureOut">
               <a:rPr lang="en-US" smtClean="0"/>
               <a:pPr/>
-              <a:t>4/30/2015</a:t>
+              <a:t>5/1/2015</a:t>
             </a:fld>
             <a:endParaRPr lang="en-US"/>
           </a:p>
@@ -1763,7 +1763,7 @@
             <a:fld id="{1D8BD707-D9CF-40AE-B4C6-C98DA3205C09}" type="datetimeFigureOut">
               <a:rPr lang="en-US" smtClean="0"/>
               <a:pPr/>
-              <a:t>4/30/2015</a:t>
+              <a:t>5/1/2015</a:t>
             </a:fld>
             <a:endParaRPr lang="en-US"/>
           </a:p>
@@ -1878,7 +1878,7 @@
             <a:fld id="{1D8BD707-D9CF-40AE-B4C6-C98DA3205C09}" type="datetimeFigureOut">
               <a:rPr lang="en-US" smtClean="0"/>
               <a:pPr/>
-              <a:t>4/30/2015</a:t>
+              <a:t>5/1/2015</a:t>
             </a:fld>
             <a:endParaRPr lang="en-US"/>
           </a:p>
@@ -1970,7 +1970,7 @@
             <a:fld id="{1D8BD707-D9CF-40AE-B4C6-C98DA3205C09}" type="datetimeFigureOut">
               <a:rPr lang="en-US" smtClean="0"/>
               <a:pPr/>
-              <a:t>4/30/2015</a:t>
+              <a:t>5/1/2015</a:t>
             </a:fld>
             <a:endParaRPr lang="en-US"/>
           </a:p>
@@ -2244,7 +2244,7 @@
             <a:fld id="{1D8BD707-D9CF-40AE-B4C6-C98DA3205C09}" type="datetimeFigureOut">
               <a:rPr lang="en-US" smtClean="0"/>
               <a:pPr/>
-              <a:t>4/30/2015</a:t>
+              <a:t>5/1/2015</a:t>
             </a:fld>
             <a:endParaRPr lang="en-US"/>
           </a:p>
@@ -2494,7 +2494,7 @@
             <a:fld id="{1D8BD707-D9CF-40AE-B4C6-C98DA3205C09}" type="datetimeFigureOut">
               <a:rPr lang="en-US" smtClean="0"/>
               <a:pPr/>
-              <a:t>4/30/2015</a:t>
+              <a:t>5/1/2015</a:t>
             </a:fld>
             <a:endParaRPr lang="en-US"/>
           </a:p>
@@ -2704,7 +2704,7 @@
             <a:fld id="{1D8BD707-D9CF-40AE-B4C6-C98DA3205C09}" type="datetimeFigureOut">
               <a:rPr lang="en-US" smtClean="0"/>
               <a:pPr/>
-              <a:t>4/30/2015</a:t>
+              <a:t>5/1/2015</a:t>
             </a:fld>
             <a:endParaRPr lang="en-US"/>
           </a:p>
@@ -3077,1300 +3077,13 @@
       </p:grpSpPr>
       <p:sp>
         <p:nvSpPr>
-          <p:cNvPr id="12" name="Oval 11"/>
-          <p:cNvSpPr/>
-          <p:nvPr/>
-        </p:nvSpPr>
-        <p:spPr>
-          <a:xfrm>
-            <a:off x="4495800" y="3430400"/>
-            <a:ext cx="1504372" cy="914400"/>
-          </a:xfrm>
-          <a:prstGeom prst="ellipse">
-            <a:avLst/>
-          </a:prstGeom>
-          <a:solidFill>
-            <a:schemeClr val="bg1">
-              <a:lumMod val="85000"/>
-            </a:schemeClr>
-          </a:solidFill>
-          <a:ln>
-            <a:solidFill>
-              <a:schemeClr val="tx1"/>
-            </a:solidFill>
-          </a:ln>
-        </p:spPr>
-        <p:style>
-          <a:lnRef idx="2">
-            <a:schemeClr val="accent1">
-              <a:shade val="50000"/>
-            </a:schemeClr>
-          </a:lnRef>
-          <a:fillRef idx="1">
-            <a:schemeClr val="accent1"/>
-          </a:fillRef>
-          <a:effectRef idx="0">
-            <a:schemeClr val="accent1"/>
-          </a:effectRef>
-          <a:fontRef idx="minor">
-            <a:schemeClr val="lt1"/>
-          </a:fontRef>
-        </p:style>
-        <p:txBody>
-          <a:bodyPr rtlCol="0" anchor="ctr"/>
-          <a:lstStyle/>
-          <a:p>
-            <a:pPr algn="ctr"/>
-            <a:r>
-              <a:rPr lang="en-US" b="1" i="1" dirty="0" smtClean="0">
-                <a:solidFill>
-                  <a:schemeClr val="tx1"/>
-                </a:solidFill>
-              </a:rPr>
-              <a:t>Z</a:t>
-            </a:r>
-            <a:r>
-              <a:rPr lang="en-US" b="1" dirty="0" smtClean="0">
-                <a:solidFill>
-                  <a:schemeClr val="tx1"/>
-                </a:solidFill>
-              </a:rPr>
-              <a:t>=0</a:t>
-            </a:r>
-          </a:p>
-          <a:p>
-            <a:pPr algn="ctr"/>
-            <a:r>
-              <a:rPr lang="en-US" sz="1000" i="1" dirty="0" smtClean="0">
-                <a:solidFill>
-                  <a:schemeClr val="tx1"/>
-                </a:solidFill>
-              </a:rPr>
-              <a:t>U</a:t>
-            </a:r>
-            <a:r>
-              <a:rPr lang="en-US" sz="1000" dirty="0" smtClean="0">
-                <a:solidFill>
-                  <a:schemeClr val="tx1"/>
-                </a:solidFill>
-              </a:rPr>
-              <a:t>=0, </a:t>
-            </a:r>
-            <a:r>
-              <a:rPr lang="en-US" sz="1000" i="1" dirty="0" smtClean="0">
-                <a:solidFill>
-                  <a:schemeClr val="tx1"/>
-                </a:solidFill>
-              </a:rPr>
-              <a:t>W</a:t>
-            </a:r>
-            <a:r>
-              <a:rPr lang="en-US" sz="1000" dirty="0" smtClean="0">
-                <a:solidFill>
-                  <a:schemeClr val="tx1"/>
-                </a:solidFill>
-              </a:rPr>
-              <a:t>=0, </a:t>
-            </a:r>
-            <a:r>
-              <a:rPr lang="en-US" sz="1000" i="1" dirty="0" smtClean="0">
-                <a:solidFill>
-                  <a:schemeClr val="tx1"/>
-                </a:solidFill>
-              </a:rPr>
-              <a:t>X</a:t>
-            </a:r>
-            <a:r>
-              <a:rPr lang="en-US" sz="1000" dirty="0" smtClean="0">
-                <a:solidFill>
-                  <a:schemeClr val="tx1"/>
-                </a:solidFill>
-              </a:rPr>
-              <a:t>=0</a:t>
-            </a:r>
-            <a:endParaRPr lang="en-US" sz="1000" dirty="0">
-              <a:solidFill>
-                <a:schemeClr val="tx1"/>
-              </a:solidFill>
-            </a:endParaRPr>
-          </a:p>
-        </p:txBody>
-      </p:sp>
-      <p:sp>
-        <p:nvSpPr>
-          <p:cNvPr id="13" name="Oval 12"/>
-          <p:cNvSpPr/>
-          <p:nvPr/>
-        </p:nvSpPr>
-        <p:spPr>
-          <a:xfrm>
-            <a:off x="4495800" y="5558682"/>
-            <a:ext cx="1504372" cy="914400"/>
-          </a:xfrm>
-          <a:prstGeom prst="ellipse">
-            <a:avLst/>
-          </a:prstGeom>
-          <a:solidFill>
-            <a:schemeClr val="bg1">
-              <a:lumMod val="85000"/>
-            </a:schemeClr>
-          </a:solidFill>
-          <a:ln>
-            <a:solidFill>
-              <a:schemeClr val="tx1"/>
-            </a:solidFill>
-          </a:ln>
-        </p:spPr>
-        <p:style>
-          <a:lnRef idx="2">
-            <a:schemeClr val="accent1">
-              <a:shade val="50000"/>
-            </a:schemeClr>
-          </a:lnRef>
-          <a:fillRef idx="1">
-            <a:schemeClr val="accent1"/>
-          </a:fillRef>
-          <a:effectRef idx="0">
-            <a:schemeClr val="accent1"/>
-          </a:effectRef>
-          <a:fontRef idx="minor">
-            <a:schemeClr val="lt1"/>
-          </a:fontRef>
-        </p:style>
-        <p:txBody>
-          <a:bodyPr rtlCol="0" anchor="ctr"/>
-          <a:lstStyle/>
-          <a:p>
-            <a:pPr algn="ctr"/>
-            <a:r>
-              <a:rPr lang="en-US" b="1" i="1" dirty="0" smtClean="0">
-                <a:solidFill>
-                  <a:schemeClr val="tx1"/>
-                </a:solidFill>
-              </a:rPr>
-              <a:t>Z</a:t>
-            </a:r>
-            <a:r>
-              <a:rPr lang="en-US" b="1" dirty="0" smtClean="0">
-                <a:solidFill>
-                  <a:schemeClr val="tx1"/>
-                </a:solidFill>
-              </a:rPr>
-              <a:t>=1</a:t>
-            </a:r>
-          </a:p>
-          <a:p>
-            <a:pPr algn="ctr"/>
-            <a:r>
-              <a:rPr lang="en-US" sz="1000" i="1" dirty="0" smtClean="0">
-                <a:solidFill>
-                  <a:schemeClr val="tx1"/>
-                </a:solidFill>
-              </a:rPr>
-              <a:t>U</a:t>
-            </a:r>
-            <a:r>
-              <a:rPr lang="en-US" sz="1000" dirty="0" smtClean="0">
-                <a:solidFill>
-                  <a:schemeClr val="tx1"/>
-                </a:solidFill>
-              </a:rPr>
-              <a:t>=1, </a:t>
-            </a:r>
-            <a:r>
-              <a:rPr lang="en-US" sz="1000" i="1" dirty="0" smtClean="0">
-                <a:solidFill>
-                  <a:schemeClr val="tx1"/>
-                </a:solidFill>
-              </a:rPr>
-              <a:t>W</a:t>
-            </a:r>
-            <a:r>
-              <a:rPr lang="en-US" sz="1000" dirty="0" smtClean="0">
-                <a:solidFill>
-                  <a:schemeClr val="tx1"/>
-                </a:solidFill>
-              </a:rPr>
-              <a:t>=0, </a:t>
-            </a:r>
-            <a:r>
-              <a:rPr lang="en-US" sz="1000" i="1" dirty="0" smtClean="0">
-                <a:solidFill>
-                  <a:schemeClr val="tx1"/>
-                </a:solidFill>
-              </a:rPr>
-              <a:t>X</a:t>
-            </a:r>
-            <a:r>
-              <a:rPr lang="en-US" sz="1000" dirty="0" smtClean="0">
-                <a:solidFill>
-                  <a:schemeClr val="tx1"/>
-                </a:solidFill>
-              </a:rPr>
-              <a:t>=0</a:t>
-            </a:r>
-            <a:endParaRPr lang="en-US" sz="1000" dirty="0">
-              <a:solidFill>
-                <a:schemeClr val="tx1"/>
-              </a:solidFill>
-            </a:endParaRPr>
-          </a:p>
-        </p:txBody>
-      </p:sp>
-      <p:sp>
-        <p:nvSpPr>
-          <p:cNvPr id="14" name="Oval 13"/>
-          <p:cNvSpPr/>
-          <p:nvPr/>
-        </p:nvSpPr>
-        <p:spPr>
-          <a:xfrm>
-            <a:off x="7010400" y="3434318"/>
-            <a:ext cx="1504372" cy="914400"/>
-          </a:xfrm>
-          <a:prstGeom prst="ellipse">
-            <a:avLst/>
-          </a:prstGeom>
-          <a:solidFill>
-            <a:schemeClr val="bg1">
-              <a:lumMod val="85000"/>
-            </a:schemeClr>
-          </a:solidFill>
-          <a:ln>
-            <a:solidFill>
-              <a:schemeClr val="tx1"/>
-            </a:solidFill>
-          </a:ln>
-        </p:spPr>
-        <p:style>
-          <a:lnRef idx="2">
-            <a:schemeClr val="accent1">
-              <a:shade val="50000"/>
-            </a:schemeClr>
-          </a:lnRef>
-          <a:fillRef idx="1">
-            <a:schemeClr val="accent1"/>
-          </a:fillRef>
-          <a:effectRef idx="0">
-            <a:schemeClr val="accent1"/>
-          </a:effectRef>
-          <a:fontRef idx="minor">
-            <a:schemeClr val="lt1"/>
-          </a:fontRef>
-        </p:style>
-        <p:txBody>
-          <a:bodyPr rtlCol="0" anchor="ctr"/>
-          <a:lstStyle/>
-          <a:p>
-            <a:pPr algn="ctr"/>
-            <a:r>
-              <a:rPr lang="en-US" b="1" i="1" dirty="0" smtClean="0">
-                <a:solidFill>
-                  <a:schemeClr val="tx1"/>
-                </a:solidFill>
-              </a:rPr>
-              <a:t>Z</a:t>
-            </a:r>
-            <a:r>
-              <a:rPr lang="en-US" b="1" dirty="0" smtClean="0">
-                <a:solidFill>
-                  <a:schemeClr val="tx1"/>
-                </a:solidFill>
-              </a:rPr>
-              <a:t>=2</a:t>
-            </a:r>
-          </a:p>
-          <a:p>
-            <a:pPr algn="ctr"/>
-            <a:r>
-              <a:rPr lang="en-US" sz="1000" i="1" dirty="0" smtClean="0">
-                <a:solidFill>
-                  <a:schemeClr val="tx1"/>
-                </a:solidFill>
-              </a:rPr>
-              <a:t>U</a:t>
-            </a:r>
-            <a:r>
-              <a:rPr lang="en-US" sz="1000" dirty="0" smtClean="0">
-                <a:solidFill>
-                  <a:schemeClr val="tx1"/>
-                </a:solidFill>
-              </a:rPr>
-              <a:t>=1, </a:t>
-            </a:r>
-            <a:r>
-              <a:rPr lang="en-US" sz="1000" i="1" dirty="0" smtClean="0">
-                <a:solidFill>
-                  <a:schemeClr val="tx1"/>
-                </a:solidFill>
-              </a:rPr>
-              <a:t>W</a:t>
-            </a:r>
-            <a:r>
-              <a:rPr lang="en-US" sz="1000" dirty="0" smtClean="0">
-                <a:solidFill>
-                  <a:schemeClr val="tx1"/>
-                </a:solidFill>
-              </a:rPr>
-              <a:t>=0, </a:t>
-            </a:r>
-            <a:r>
-              <a:rPr lang="en-US" sz="1000" i="1" dirty="0" smtClean="0">
-                <a:solidFill>
-                  <a:schemeClr val="tx1"/>
-                </a:solidFill>
-              </a:rPr>
-              <a:t>X</a:t>
-            </a:r>
-            <a:r>
-              <a:rPr lang="en-US" sz="1000" dirty="0" smtClean="0">
-                <a:solidFill>
-                  <a:schemeClr val="tx1"/>
-                </a:solidFill>
-              </a:rPr>
-              <a:t>=1</a:t>
-            </a:r>
-            <a:endParaRPr lang="en-US" sz="1000" dirty="0">
-              <a:solidFill>
-                <a:schemeClr val="tx1"/>
-              </a:solidFill>
-            </a:endParaRPr>
-          </a:p>
-        </p:txBody>
-      </p:sp>
-      <p:sp>
-        <p:nvSpPr>
-          <p:cNvPr id="15" name="Oval 14"/>
-          <p:cNvSpPr/>
-          <p:nvPr/>
-        </p:nvSpPr>
-        <p:spPr>
-          <a:xfrm>
-            <a:off x="7010400" y="5562600"/>
-            <a:ext cx="1504372" cy="914400"/>
-          </a:xfrm>
-          <a:prstGeom prst="ellipse">
-            <a:avLst/>
-          </a:prstGeom>
-          <a:solidFill>
-            <a:schemeClr val="bg1">
-              <a:lumMod val="85000"/>
-            </a:schemeClr>
-          </a:solidFill>
-          <a:ln>
-            <a:solidFill>
-              <a:schemeClr val="tx1"/>
-            </a:solidFill>
-          </a:ln>
-        </p:spPr>
-        <p:style>
-          <a:lnRef idx="2">
-            <a:schemeClr val="accent1">
-              <a:shade val="50000"/>
-            </a:schemeClr>
-          </a:lnRef>
-          <a:fillRef idx="1">
-            <a:schemeClr val="accent1"/>
-          </a:fillRef>
-          <a:effectRef idx="0">
-            <a:schemeClr val="accent1"/>
-          </a:effectRef>
-          <a:fontRef idx="minor">
-            <a:schemeClr val="lt1"/>
-          </a:fontRef>
-        </p:style>
-        <p:txBody>
-          <a:bodyPr rtlCol="0" anchor="ctr"/>
-          <a:lstStyle/>
-          <a:p>
-            <a:pPr algn="ctr"/>
-            <a:r>
-              <a:rPr lang="en-US" b="1" i="1" dirty="0" smtClean="0">
-                <a:solidFill>
-                  <a:schemeClr val="tx1"/>
-                </a:solidFill>
-              </a:rPr>
-              <a:t>Z</a:t>
-            </a:r>
-            <a:r>
-              <a:rPr lang="en-US" b="1" dirty="0" smtClean="0">
-                <a:solidFill>
-                  <a:schemeClr val="tx1"/>
-                </a:solidFill>
-              </a:rPr>
-              <a:t>=3</a:t>
-            </a:r>
-          </a:p>
-          <a:p>
-            <a:pPr algn="ctr"/>
-            <a:r>
-              <a:rPr lang="en-US" sz="1000" i="1" dirty="0" smtClean="0">
-                <a:solidFill>
-                  <a:schemeClr val="tx1"/>
-                </a:solidFill>
-              </a:rPr>
-              <a:t>U</a:t>
-            </a:r>
-            <a:r>
-              <a:rPr lang="en-US" sz="1000" dirty="0" smtClean="0">
-                <a:solidFill>
-                  <a:schemeClr val="tx1"/>
-                </a:solidFill>
-              </a:rPr>
-              <a:t>=1, </a:t>
-            </a:r>
-            <a:r>
-              <a:rPr lang="en-US" sz="1000" i="1" dirty="0" smtClean="0">
-                <a:solidFill>
-                  <a:schemeClr val="tx1"/>
-                </a:solidFill>
-              </a:rPr>
-              <a:t>W</a:t>
-            </a:r>
-            <a:r>
-              <a:rPr lang="en-US" sz="1000" dirty="0" smtClean="0">
-                <a:solidFill>
-                  <a:schemeClr val="tx1"/>
-                </a:solidFill>
-              </a:rPr>
-              <a:t>=1, </a:t>
-            </a:r>
-            <a:r>
-              <a:rPr lang="en-US" sz="1000" i="1" dirty="0" smtClean="0">
-                <a:solidFill>
-                  <a:schemeClr val="tx1"/>
-                </a:solidFill>
-              </a:rPr>
-              <a:t>X</a:t>
-            </a:r>
-            <a:r>
-              <a:rPr lang="en-US" sz="1000" dirty="0" smtClean="0">
-                <a:solidFill>
-                  <a:schemeClr val="tx1"/>
-                </a:solidFill>
-              </a:rPr>
-              <a:t>=1</a:t>
-            </a:r>
-            <a:endParaRPr lang="en-US" sz="1000" dirty="0">
-              <a:solidFill>
-                <a:schemeClr val="tx1"/>
-              </a:solidFill>
-            </a:endParaRPr>
-          </a:p>
-        </p:txBody>
-      </p:sp>
-      <p:cxnSp>
-        <p:nvCxnSpPr>
-          <p:cNvPr id="16" name="Straight Arrow Connector 15"/>
-          <p:cNvCxnSpPr>
-            <a:stCxn id="12" idx="6"/>
-            <a:endCxn id="14" idx="2"/>
-          </p:cNvCxnSpPr>
-          <p:nvPr/>
-        </p:nvCxnSpPr>
-        <p:spPr>
-          <a:xfrm>
-            <a:off x="6000172" y="3887600"/>
-            <a:ext cx="1010228" cy="3918"/>
-          </a:xfrm>
-          <a:prstGeom prst="straightConnector1">
-            <a:avLst/>
-          </a:prstGeom>
-          <a:ln w="15875">
-            <a:solidFill>
-              <a:schemeClr val="tx1"/>
-            </a:solidFill>
-            <a:tailEnd type="triangle"/>
-          </a:ln>
-        </p:spPr>
-        <p:style>
-          <a:lnRef idx="1">
-            <a:schemeClr val="accent1"/>
-          </a:lnRef>
-          <a:fillRef idx="0">
-            <a:schemeClr val="accent1"/>
-          </a:fillRef>
-          <a:effectRef idx="0">
-            <a:schemeClr val="accent1"/>
-          </a:effectRef>
-          <a:fontRef idx="minor">
-            <a:schemeClr val="tx1"/>
-          </a:fontRef>
-        </p:style>
-      </p:cxnSp>
-      <p:cxnSp>
-        <p:nvCxnSpPr>
-          <p:cNvPr id="17" name="Straight Arrow Connector 16"/>
-          <p:cNvCxnSpPr>
-            <a:stCxn id="14" idx="4"/>
-            <a:endCxn id="15" idx="0"/>
-          </p:cNvCxnSpPr>
-          <p:nvPr/>
-        </p:nvCxnSpPr>
-        <p:spPr>
-          <a:xfrm>
-            <a:off x="7762586" y="4348718"/>
-            <a:ext cx="0" cy="1213882"/>
-          </a:xfrm>
-          <a:prstGeom prst="straightConnector1">
-            <a:avLst/>
-          </a:prstGeom>
-          <a:ln w="15875">
-            <a:solidFill>
-              <a:schemeClr val="tx1"/>
-            </a:solidFill>
-            <a:tailEnd type="triangle"/>
-          </a:ln>
-        </p:spPr>
-        <p:style>
-          <a:lnRef idx="1">
-            <a:schemeClr val="accent1"/>
-          </a:lnRef>
-          <a:fillRef idx="0">
-            <a:schemeClr val="accent1"/>
-          </a:fillRef>
-          <a:effectRef idx="0">
-            <a:schemeClr val="accent1"/>
-          </a:effectRef>
-          <a:fontRef idx="minor">
-            <a:schemeClr val="tx1"/>
-          </a:fontRef>
-        </p:style>
-      </p:cxnSp>
-      <p:cxnSp>
-        <p:nvCxnSpPr>
-          <p:cNvPr id="18" name="Straight Arrow Connector 17"/>
-          <p:cNvCxnSpPr>
-            <a:stCxn id="14" idx="3"/>
-            <a:endCxn id="13" idx="7"/>
-          </p:cNvCxnSpPr>
-          <p:nvPr/>
-        </p:nvCxnSpPr>
-        <p:spPr>
-          <a:xfrm flipH="1">
-            <a:off x="5779862" y="4214807"/>
-            <a:ext cx="1450848" cy="1477786"/>
-          </a:xfrm>
-          <a:prstGeom prst="straightConnector1">
-            <a:avLst/>
-          </a:prstGeom>
-          <a:ln w="15875">
-            <a:solidFill>
-              <a:schemeClr val="tx1"/>
-            </a:solidFill>
-            <a:tailEnd type="triangle"/>
-          </a:ln>
-        </p:spPr>
-        <p:style>
-          <a:lnRef idx="1">
-            <a:schemeClr val="accent1"/>
-          </a:lnRef>
-          <a:fillRef idx="0">
-            <a:schemeClr val="accent1"/>
-          </a:fillRef>
-          <a:effectRef idx="0">
-            <a:schemeClr val="accent1"/>
-          </a:effectRef>
-          <a:fontRef idx="minor">
-            <a:schemeClr val="tx1"/>
-          </a:fontRef>
-        </p:style>
-      </p:cxnSp>
-      <p:cxnSp>
-        <p:nvCxnSpPr>
-          <p:cNvPr id="19" name="Straight Arrow Connector 18"/>
-          <p:cNvCxnSpPr>
-            <a:stCxn id="15" idx="2"/>
-            <a:endCxn id="13" idx="6"/>
-          </p:cNvCxnSpPr>
-          <p:nvPr/>
-        </p:nvCxnSpPr>
-        <p:spPr>
-          <a:xfrm flipH="1" flipV="1">
-            <a:off x="6000172" y="6015882"/>
-            <a:ext cx="1010228" cy="3918"/>
-          </a:xfrm>
-          <a:prstGeom prst="straightConnector1">
-            <a:avLst/>
-          </a:prstGeom>
-          <a:ln w="15875">
-            <a:solidFill>
-              <a:schemeClr val="tx1"/>
-            </a:solidFill>
-            <a:tailEnd type="triangle"/>
-          </a:ln>
-        </p:spPr>
-        <p:style>
-          <a:lnRef idx="1">
-            <a:schemeClr val="accent1"/>
-          </a:lnRef>
-          <a:fillRef idx="0">
-            <a:schemeClr val="accent1"/>
-          </a:fillRef>
-          <a:effectRef idx="0">
-            <a:schemeClr val="accent1"/>
-          </a:effectRef>
-          <a:fontRef idx="minor">
-            <a:schemeClr val="tx1"/>
-          </a:fontRef>
-        </p:style>
-      </p:cxnSp>
-      <p:cxnSp>
-        <p:nvCxnSpPr>
-          <p:cNvPr id="20" name="Straight Arrow Connector 19"/>
-          <p:cNvCxnSpPr>
-            <a:stCxn id="13" idx="0"/>
-            <a:endCxn id="12" idx="4"/>
-          </p:cNvCxnSpPr>
-          <p:nvPr/>
-        </p:nvCxnSpPr>
-        <p:spPr>
-          <a:xfrm flipV="1">
-            <a:off x="5247986" y="4344800"/>
-            <a:ext cx="0" cy="1213882"/>
-          </a:xfrm>
-          <a:prstGeom prst="straightConnector1">
-            <a:avLst/>
-          </a:prstGeom>
-          <a:ln w="15875">
-            <a:solidFill>
-              <a:schemeClr val="tx1"/>
-            </a:solidFill>
-            <a:tailEnd type="triangle"/>
-          </a:ln>
-        </p:spPr>
-        <p:style>
-          <a:lnRef idx="1">
-            <a:schemeClr val="accent1"/>
-          </a:lnRef>
-          <a:fillRef idx="0">
-            <a:schemeClr val="accent1"/>
-          </a:fillRef>
-          <a:effectRef idx="0">
-            <a:schemeClr val="accent1"/>
-          </a:effectRef>
-          <a:fontRef idx="minor">
-            <a:schemeClr val="tx1"/>
-          </a:fontRef>
-        </p:style>
-      </p:cxnSp>
-      <p:cxnSp>
-        <p:nvCxnSpPr>
-          <p:cNvPr id="21" name="Straight Arrow Connector 20"/>
-          <p:cNvCxnSpPr/>
-          <p:nvPr/>
-        </p:nvCxnSpPr>
-        <p:spPr>
-          <a:xfrm flipV="1">
-            <a:off x="5486400" y="4110882"/>
-            <a:ext cx="1600200" cy="1519366"/>
-          </a:xfrm>
-          <a:prstGeom prst="straightConnector1">
-            <a:avLst/>
-          </a:prstGeom>
-          <a:ln w="15875">
-            <a:solidFill>
-              <a:schemeClr val="tx1"/>
-            </a:solidFill>
-            <a:tailEnd type="triangle"/>
-          </a:ln>
-        </p:spPr>
-        <p:style>
-          <a:lnRef idx="1">
-            <a:schemeClr val="accent1"/>
-          </a:lnRef>
-          <a:fillRef idx="0">
-            <a:schemeClr val="accent1"/>
-          </a:fillRef>
-          <a:effectRef idx="0">
-            <a:schemeClr val="accent1"/>
-          </a:effectRef>
-          <a:fontRef idx="minor">
-            <a:schemeClr val="tx1"/>
-          </a:fontRef>
-        </p:style>
-      </p:cxnSp>
-      <p:cxnSp>
-        <p:nvCxnSpPr>
-          <p:cNvPr id="22" name="Straight Arrow Connector 21"/>
-          <p:cNvCxnSpPr/>
-          <p:nvPr/>
-        </p:nvCxnSpPr>
-        <p:spPr>
-          <a:xfrm>
-            <a:off x="5029200" y="4339482"/>
-            <a:ext cx="0" cy="1219200"/>
-          </a:xfrm>
-          <a:prstGeom prst="straightConnector1">
-            <a:avLst/>
-          </a:prstGeom>
-          <a:ln w="15875">
-            <a:solidFill>
-              <a:schemeClr val="tx1"/>
-            </a:solidFill>
-            <a:tailEnd type="triangle"/>
-          </a:ln>
-        </p:spPr>
-        <p:style>
-          <a:lnRef idx="1">
-            <a:schemeClr val="accent1"/>
-          </a:lnRef>
-          <a:fillRef idx="0">
-            <a:schemeClr val="accent1"/>
-          </a:fillRef>
-          <a:effectRef idx="0">
-            <a:schemeClr val="accent1"/>
-          </a:effectRef>
-          <a:fontRef idx="minor">
-            <a:schemeClr val="tx1"/>
-          </a:fontRef>
-        </p:style>
-      </p:cxnSp>
-      <p:cxnSp>
-        <p:nvCxnSpPr>
-          <p:cNvPr id="23" name="Straight Arrow Connector 22"/>
-          <p:cNvCxnSpPr/>
-          <p:nvPr/>
-        </p:nvCxnSpPr>
-        <p:spPr>
-          <a:xfrm flipV="1">
-            <a:off x="7848600" y="4348718"/>
-            <a:ext cx="0" cy="1219200"/>
-          </a:xfrm>
-          <a:prstGeom prst="straightConnector1">
-            <a:avLst/>
-          </a:prstGeom>
-          <a:ln w="15875">
-            <a:solidFill>
-              <a:schemeClr val="tx1"/>
-            </a:solidFill>
-            <a:tailEnd type="triangle"/>
-          </a:ln>
-        </p:spPr>
-        <p:style>
-          <a:lnRef idx="1">
-            <a:schemeClr val="accent1"/>
-          </a:lnRef>
-          <a:fillRef idx="0">
-            <a:schemeClr val="accent1"/>
-          </a:fillRef>
-          <a:effectRef idx="0">
-            <a:schemeClr val="accent1"/>
-          </a:effectRef>
-          <a:fontRef idx="minor">
-            <a:schemeClr val="tx1"/>
-          </a:fontRef>
-        </p:style>
-      </p:cxnSp>
-      <p:cxnSp>
-        <p:nvCxnSpPr>
-          <p:cNvPr id="24" name="Curved Connector 23"/>
-          <p:cNvCxnSpPr>
-            <a:stCxn id="13" idx="4"/>
-            <a:endCxn id="13" idx="2"/>
-          </p:cNvCxnSpPr>
-          <p:nvPr/>
-        </p:nvCxnSpPr>
-        <p:spPr>
-          <a:xfrm rot="5400000" flipH="1">
-            <a:off x="4643293" y="5868389"/>
-            <a:ext cx="457200" cy="752186"/>
-          </a:xfrm>
-          <a:prstGeom prst="curvedConnector4">
-            <a:avLst>
-              <a:gd name="adj1" fmla="val -50000"/>
-              <a:gd name="adj2" fmla="val 130391"/>
-            </a:avLst>
-          </a:prstGeom>
-          <a:ln w="15875">
-            <a:solidFill>
-              <a:schemeClr val="tx1"/>
-            </a:solidFill>
-            <a:tailEnd type="triangle"/>
-          </a:ln>
-        </p:spPr>
-        <p:style>
-          <a:lnRef idx="1">
-            <a:schemeClr val="accent1"/>
-          </a:lnRef>
-          <a:fillRef idx="0">
-            <a:schemeClr val="accent1"/>
-          </a:fillRef>
-          <a:effectRef idx="0">
-            <a:schemeClr val="accent1"/>
-          </a:effectRef>
-          <a:fontRef idx="minor">
-            <a:schemeClr val="tx1"/>
-          </a:fontRef>
-        </p:style>
-      </p:cxnSp>
-      <p:cxnSp>
-        <p:nvCxnSpPr>
-          <p:cNvPr id="29" name="Curved Connector 28"/>
-          <p:cNvCxnSpPr>
-            <a:stCxn id="14" idx="0"/>
-            <a:endCxn id="14" idx="6"/>
-          </p:cNvCxnSpPr>
-          <p:nvPr/>
-        </p:nvCxnSpPr>
-        <p:spPr>
-          <a:xfrm rot="16200000" flipH="1">
-            <a:off x="7910079" y="3286825"/>
-            <a:ext cx="457200" cy="752186"/>
-          </a:xfrm>
-          <a:prstGeom prst="curvedConnector4">
-            <a:avLst>
-              <a:gd name="adj1" fmla="val -50000"/>
-              <a:gd name="adj2" fmla="val 130391"/>
-            </a:avLst>
-          </a:prstGeom>
-          <a:ln w="15875">
-            <a:solidFill>
-              <a:schemeClr val="tx1"/>
-            </a:solidFill>
-            <a:tailEnd type="triangle"/>
-          </a:ln>
-        </p:spPr>
-        <p:style>
-          <a:lnRef idx="1">
-            <a:schemeClr val="accent1"/>
-          </a:lnRef>
-          <a:fillRef idx="0">
-            <a:schemeClr val="accent1"/>
-          </a:fillRef>
-          <a:effectRef idx="0">
-            <a:schemeClr val="accent1"/>
-          </a:effectRef>
-          <a:fontRef idx="minor">
-            <a:schemeClr val="tx1"/>
-          </a:fontRef>
-        </p:style>
-      </p:cxnSp>
-      <p:cxnSp>
-        <p:nvCxnSpPr>
-          <p:cNvPr id="30" name="Curved Connector 29"/>
-          <p:cNvCxnSpPr>
-            <a:stCxn id="15" idx="6"/>
-            <a:endCxn id="15" idx="4"/>
-          </p:cNvCxnSpPr>
-          <p:nvPr/>
-        </p:nvCxnSpPr>
-        <p:spPr>
-          <a:xfrm flipH="1">
-            <a:off x="7762586" y="6019800"/>
-            <a:ext cx="752186" cy="457200"/>
-          </a:xfrm>
-          <a:prstGeom prst="curvedConnector4">
-            <a:avLst>
-              <a:gd name="adj1" fmla="val -30391"/>
-              <a:gd name="adj2" fmla="val 150000"/>
-            </a:avLst>
-          </a:prstGeom>
-          <a:ln w="15875">
-            <a:solidFill>
-              <a:schemeClr val="tx1"/>
-            </a:solidFill>
-            <a:tailEnd type="triangle"/>
-          </a:ln>
-        </p:spPr>
-        <p:style>
-          <a:lnRef idx="1">
-            <a:schemeClr val="accent1"/>
-          </a:lnRef>
-          <a:fillRef idx="0">
-            <a:schemeClr val="accent1"/>
-          </a:fillRef>
-          <a:effectRef idx="0">
-            <a:schemeClr val="accent1"/>
-          </a:effectRef>
-          <a:fontRef idx="minor">
-            <a:schemeClr val="tx1"/>
-          </a:fontRef>
-        </p:style>
-      </p:cxnSp>
-      <p:sp>
-        <p:nvSpPr>
-          <p:cNvPr id="31" name="TextBox 30"/>
-          <p:cNvSpPr txBox="1"/>
-          <p:nvPr/>
-        </p:nvSpPr>
-        <p:spPr>
-          <a:xfrm>
-            <a:off x="4620492" y="4491882"/>
-            <a:ext cx="705428" cy="369332"/>
-          </a:xfrm>
-          <a:prstGeom prst="rect">
-            <a:avLst/>
-          </a:prstGeom>
-          <a:noFill/>
-        </p:spPr>
-        <p:txBody>
-          <a:bodyPr wrap="square" rtlCol="0">
-            <a:spAutoFit/>
-          </a:bodyPr>
-          <a:lstStyle/>
-          <a:p>
-            <a:r>
-              <a:rPr lang="el-GR" i="1" dirty="0" smtClean="0"/>
-              <a:t>π</a:t>
-            </a:r>
-            <a:r>
-              <a:rPr lang="en-US" baseline="-25000" dirty="0" smtClean="0"/>
-              <a:t>01</a:t>
-            </a:r>
-            <a:endParaRPr lang="en-US" dirty="0"/>
-          </a:p>
-        </p:txBody>
-      </p:sp>
-      <p:sp>
-        <p:nvSpPr>
-          <p:cNvPr id="32" name="TextBox 31"/>
-          <p:cNvSpPr txBox="1"/>
-          <p:nvPr/>
-        </p:nvSpPr>
-        <p:spPr>
-          <a:xfrm>
-            <a:off x="5161972" y="4964668"/>
-            <a:ext cx="705428" cy="369332"/>
-          </a:xfrm>
-          <a:prstGeom prst="rect">
-            <a:avLst/>
-          </a:prstGeom>
-          <a:noFill/>
-        </p:spPr>
-        <p:txBody>
-          <a:bodyPr wrap="square" rtlCol="0">
-            <a:spAutoFit/>
-          </a:bodyPr>
-          <a:lstStyle/>
-          <a:p>
-            <a:r>
-              <a:rPr lang="el-GR" i="1" dirty="0" smtClean="0"/>
-              <a:t>π</a:t>
-            </a:r>
-            <a:r>
-              <a:rPr lang="en-US" baseline="-25000" dirty="0" smtClean="0"/>
-              <a:t>00</a:t>
-            </a:r>
-            <a:endParaRPr lang="en-US" dirty="0"/>
-          </a:p>
-        </p:txBody>
-      </p:sp>
-      <p:sp>
-        <p:nvSpPr>
-          <p:cNvPr id="37" name="TextBox 36"/>
-          <p:cNvSpPr txBox="1"/>
-          <p:nvPr/>
-        </p:nvSpPr>
-        <p:spPr>
-          <a:xfrm>
-            <a:off x="3866572" y="6183868"/>
-            <a:ext cx="705428" cy="369332"/>
-          </a:xfrm>
-          <a:prstGeom prst="rect">
-            <a:avLst/>
-          </a:prstGeom>
-          <a:noFill/>
-        </p:spPr>
-        <p:txBody>
-          <a:bodyPr wrap="square" rtlCol="0">
-            <a:spAutoFit/>
-          </a:bodyPr>
-          <a:lstStyle/>
-          <a:p>
-            <a:r>
-              <a:rPr lang="el-GR" i="1" dirty="0" smtClean="0"/>
-              <a:t>π</a:t>
-            </a:r>
-            <a:r>
-              <a:rPr lang="en-US" baseline="-25000" dirty="0" smtClean="0"/>
-              <a:t>01</a:t>
-            </a:r>
-            <a:endParaRPr lang="en-US" dirty="0"/>
-          </a:p>
-        </p:txBody>
-      </p:sp>
-      <p:sp>
-        <p:nvSpPr>
-          <p:cNvPr id="38" name="TextBox 37"/>
-          <p:cNvSpPr txBox="1"/>
-          <p:nvPr/>
-        </p:nvSpPr>
-        <p:spPr>
-          <a:xfrm>
-            <a:off x="5771572" y="4648200"/>
-            <a:ext cx="705428" cy="369332"/>
-          </a:xfrm>
-          <a:prstGeom prst="rect">
-            <a:avLst/>
-          </a:prstGeom>
-          <a:noFill/>
-        </p:spPr>
-        <p:txBody>
-          <a:bodyPr wrap="square" rtlCol="0">
-            <a:spAutoFit/>
-          </a:bodyPr>
-          <a:lstStyle/>
-          <a:p>
-            <a:r>
-              <a:rPr lang="el-GR" i="1" dirty="0" smtClean="0"/>
-              <a:t>π</a:t>
-            </a:r>
-            <a:r>
-              <a:rPr lang="en-US" baseline="-25000" dirty="0" smtClean="0"/>
-              <a:t>02</a:t>
-            </a:r>
-            <a:endParaRPr lang="en-US" dirty="0"/>
-          </a:p>
-        </p:txBody>
-      </p:sp>
-      <p:sp>
-        <p:nvSpPr>
-          <p:cNvPr id="39" name="TextBox 38"/>
-          <p:cNvSpPr txBox="1"/>
-          <p:nvPr/>
-        </p:nvSpPr>
-        <p:spPr>
-          <a:xfrm>
-            <a:off x="6477000" y="5921330"/>
-            <a:ext cx="522430" cy="369332"/>
-          </a:xfrm>
-          <a:prstGeom prst="rect">
-            <a:avLst/>
-          </a:prstGeom>
-          <a:noFill/>
-        </p:spPr>
-        <p:txBody>
-          <a:bodyPr wrap="square" rtlCol="0">
-            <a:spAutoFit/>
-          </a:bodyPr>
-          <a:lstStyle/>
-          <a:p>
-            <a:r>
-              <a:rPr lang="el-GR" i="1" dirty="0" smtClean="0"/>
-              <a:t>π</a:t>
-            </a:r>
-            <a:r>
-              <a:rPr lang="en-US" baseline="-25000" dirty="0" smtClean="0"/>
-              <a:t>11</a:t>
-            </a:r>
-            <a:endParaRPr lang="en-US" dirty="0"/>
-          </a:p>
-        </p:txBody>
-      </p:sp>
-      <p:sp>
-        <p:nvSpPr>
-          <p:cNvPr id="40" name="TextBox 39"/>
-          <p:cNvSpPr txBox="1"/>
-          <p:nvPr/>
-        </p:nvSpPr>
-        <p:spPr>
-          <a:xfrm>
-            <a:off x="6629400" y="4736068"/>
-            <a:ext cx="705428" cy="369332"/>
-          </a:xfrm>
-          <a:prstGeom prst="rect">
-            <a:avLst/>
-          </a:prstGeom>
-          <a:noFill/>
-        </p:spPr>
-        <p:txBody>
-          <a:bodyPr wrap="square" rtlCol="0">
-            <a:spAutoFit/>
-          </a:bodyPr>
-          <a:lstStyle/>
-          <a:p>
-            <a:r>
-              <a:rPr lang="el-GR" i="1" dirty="0" smtClean="0"/>
-              <a:t>π</a:t>
-            </a:r>
-            <a:r>
-              <a:rPr lang="en-US" baseline="-25000" dirty="0" smtClean="0"/>
-              <a:t>11</a:t>
-            </a:r>
-            <a:endParaRPr lang="en-US" dirty="0"/>
-          </a:p>
-        </p:txBody>
-      </p:sp>
-      <p:sp>
-        <p:nvSpPr>
-          <p:cNvPr id="41" name="TextBox 40"/>
-          <p:cNvSpPr txBox="1"/>
-          <p:nvPr/>
-        </p:nvSpPr>
-        <p:spPr>
-          <a:xfrm>
-            <a:off x="6000172" y="3543298"/>
-            <a:ext cx="705428" cy="369332"/>
-          </a:xfrm>
-          <a:prstGeom prst="rect">
-            <a:avLst/>
-          </a:prstGeom>
-          <a:noFill/>
-        </p:spPr>
-        <p:txBody>
-          <a:bodyPr wrap="square" rtlCol="0">
-            <a:spAutoFit/>
-          </a:bodyPr>
-          <a:lstStyle/>
-          <a:p>
-            <a:r>
-              <a:rPr lang="el-GR" i="1" dirty="0" smtClean="0"/>
-              <a:t>π</a:t>
-            </a:r>
-            <a:r>
-              <a:rPr lang="en-US" baseline="-25000" dirty="0" smtClean="0"/>
-              <a:t>02</a:t>
-            </a:r>
-            <a:endParaRPr lang="en-US" dirty="0"/>
-          </a:p>
-        </p:txBody>
-      </p:sp>
-      <p:sp>
-        <p:nvSpPr>
-          <p:cNvPr id="42" name="TextBox 41"/>
-          <p:cNvSpPr txBox="1"/>
-          <p:nvPr/>
-        </p:nvSpPr>
-        <p:spPr>
-          <a:xfrm>
-            <a:off x="8667172" y="3131950"/>
-            <a:ext cx="705428" cy="369332"/>
-          </a:xfrm>
-          <a:prstGeom prst="rect">
-            <a:avLst/>
-          </a:prstGeom>
-          <a:noFill/>
-        </p:spPr>
-        <p:txBody>
-          <a:bodyPr wrap="square" rtlCol="0">
-            <a:spAutoFit/>
-          </a:bodyPr>
-          <a:lstStyle/>
-          <a:p>
-            <a:r>
-              <a:rPr lang="el-GR" i="1" dirty="0" smtClean="0"/>
-              <a:t>π</a:t>
-            </a:r>
-            <a:r>
-              <a:rPr lang="en-US" baseline="-25000" dirty="0" smtClean="0"/>
-              <a:t>12</a:t>
-            </a:r>
-            <a:endParaRPr lang="en-US" dirty="0"/>
-          </a:p>
-        </p:txBody>
-      </p:sp>
-      <p:sp>
-        <p:nvSpPr>
-          <p:cNvPr id="43" name="TextBox 42"/>
-          <p:cNvSpPr txBox="1"/>
-          <p:nvPr/>
-        </p:nvSpPr>
-        <p:spPr>
-          <a:xfrm>
-            <a:off x="7295572" y="4503550"/>
-            <a:ext cx="705428" cy="369332"/>
-          </a:xfrm>
-          <a:prstGeom prst="rect">
-            <a:avLst/>
-          </a:prstGeom>
-          <a:noFill/>
-        </p:spPr>
-        <p:txBody>
-          <a:bodyPr wrap="square" rtlCol="0">
-            <a:spAutoFit/>
-          </a:bodyPr>
-          <a:lstStyle/>
-          <a:p>
-            <a:r>
-              <a:rPr lang="el-GR" i="1" dirty="0" smtClean="0"/>
-              <a:t>π</a:t>
-            </a:r>
-            <a:r>
-              <a:rPr lang="en-US" baseline="-25000" dirty="0" smtClean="0"/>
-              <a:t>13</a:t>
-            </a:r>
-            <a:endParaRPr lang="en-US" dirty="0"/>
-          </a:p>
-        </p:txBody>
-      </p:sp>
-      <p:sp>
-        <p:nvSpPr>
-          <p:cNvPr id="48" name="TextBox 47"/>
-          <p:cNvSpPr txBox="1"/>
-          <p:nvPr/>
-        </p:nvSpPr>
-        <p:spPr>
-          <a:xfrm>
-            <a:off x="7859570" y="4993016"/>
-            <a:ext cx="522430" cy="369332"/>
-          </a:xfrm>
-          <a:prstGeom prst="rect">
-            <a:avLst/>
-          </a:prstGeom>
-          <a:noFill/>
-        </p:spPr>
-        <p:txBody>
-          <a:bodyPr wrap="square" rtlCol="0">
-            <a:spAutoFit/>
-          </a:bodyPr>
-          <a:lstStyle/>
-          <a:p>
-            <a:r>
-              <a:rPr lang="el-GR" i="1" dirty="0" smtClean="0"/>
-              <a:t>π</a:t>
-            </a:r>
-            <a:r>
-              <a:rPr lang="en-US" baseline="-25000" dirty="0" smtClean="0"/>
-              <a:t>12</a:t>
-            </a:r>
-            <a:endParaRPr lang="en-US" dirty="0"/>
-          </a:p>
-        </p:txBody>
-      </p:sp>
-      <p:sp>
-        <p:nvSpPr>
-          <p:cNvPr id="49" name="TextBox 48"/>
-          <p:cNvSpPr txBox="1"/>
-          <p:nvPr/>
-        </p:nvSpPr>
-        <p:spPr>
-          <a:xfrm>
-            <a:off x="8697770" y="5955268"/>
-            <a:ext cx="522430" cy="369332"/>
-          </a:xfrm>
-          <a:prstGeom prst="rect">
-            <a:avLst/>
-          </a:prstGeom>
-          <a:noFill/>
-        </p:spPr>
-        <p:txBody>
-          <a:bodyPr wrap="square" rtlCol="0">
-            <a:spAutoFit/>
-          </a:bodyPr>
-          <a:lstStyle/>
-          <a:p>
-            <a:r>
-              <a:rPr lang="el-GR" i="1" dirty="0" smtClean="0"/>
-              <a:t>π</a:t>
-            </a:r>
-            <a:r>
-              <a:rPr lang="en-US" baseline="-25000" dirty="0" smtClean="0"/>
-              <a:t>13</a:t>
-            </a:r>
-            <a:endParaRPr lang="en-US" dirty="0"/>
-          </a:p>
-        </p:txBody>
-      </p:sp>
-      <p:sp>
-        <p:nvSpPr>
           <p:cNvPr id="50" name="Oval 49"/>
           <p:cNvSpPr/>
           <p:nvPr/>
         </p:nvSpPr>
         <p:spPr>
           <a:xfrm>
-            <a:off x="781628" y="381000"/>
+            <a:off x="1469740" y="533400"/>
             <a:ext cx="970972" cy="914400"/>
           </a:xfrm>
           <a:prstGeom prst="ellipse">
@@ -4422,15 +3135,7 @@
                   <a:schemeClr val="tx1"/>
                 </a:solidFill>
               </a:rPr>
-              <a:t>=0</a:t>
-            </a:r>
-            <a:r>
-              <a:rPr lang="en-US" sz="1400" dirty="0" smtClean="0">
-                <a:solidFill>
-                  <a:schemeClr val="tx1"/>
-                </a:solidFill>
-              </a:rPr>
-              <a:t>, </a:t>
+              <a:t>=0, </a:t>
             </a:r>
             <a:r>
               <a:rPr lang="en-US" sz="1400" i="1" dirty="0" smtClean="0">
@@ -4446,15 +3151,7 @@
                   <a:schemeClr val="tx1"/>
                 </a:solidFill>
               </a:rPr>
-              <a:t>=0</a:t>
-            </a:r>
-            <a:r>
-              <a:rPr lang="en-US" sz="1400" dirty="0" smtClean="0">
-                <a:solidFill>
-                  <a:schemeClr val="tx1"/>
-                </a:solidFill>
-              </a:rPr>
-              <a:t>, </a:t>
+              <a:t>=0, </a:t>
             </a:r>
             <a:r>
               <a:rPr lang="en-US" sz="1400" i="1" dirty="0" smtClean="0">
@@ -4488,7 +3185,7 @@
         </p:nvSpPr>
         <p:spPr>
           <a:xfrm>
-            <a:off x="781628" y="1524000"/>
+            <a:off x="498768" y="2157549"/>
             <a:ext cx="970972" cy="914400"/>
           </a:xfrm>
           <a:prstGeom prst="ellipse">
@@ -4540,15 +3237,7 @@
                   <a:schemeClr val="tx1"/>
                 </a:solidFill>
               </a:rPr>
-              <a:t>=0</a:t>
-            </a:r>
-            <a:r>
-              <a:rPr lang="en-US" sz="1400" dirty="0" smtClean="0">
-                <a:solidFill>
-                  <a:schemeClr val="tx1"/>
-                </a:solidFill>
-              </a:rPr>
-              <a:t>, </a:t>
+              <a:t>=0, </a:t>
             </a:r>
             <a:r>
               <a:rPr lang="en-US" sz="1400" i="1" dirty="0" smtClean="0">
@@ -4598,7 +3287,7 @@
         </p:nvSpPr>
         <p:spPr>
           <a:xfrm>
-            <a:off x="781628" y="2667000"/>
+            <a:off x="3620656" y="533400"/>
             <a:ext cx="970972" cy="914400"/>
           </a:xfrm>
           <a:prstGeom prst="ellipse">
@@ -4666,15 +3355,7 @@
                   <a:schemeClr val="tx1"/>
                 </a:solidFill>
               </a:rPr>
-              <a:t>=0</a:t>
-            </a:r>
-            <a:r>
-              <a:rPr lang="en-US" sz="1400" dirty="0" smtClean="0">
-                <a:solidFill>
-                  <a:schemeClr val="tx1"/>
-                </a:solidFill>
-              </a:rPr>
-              <a:t>, </a:t>
+              <a:t>=0, </a:t>
             </a:r>
             <a:r>
               <a:rPr lang="en-US" sz="1400" i="1" dirty="0" smtClean="0">
@@ -4708,7 +3389,7 @@
         </p:nvSpPr>
         <p:spPr>
           <a:xfrm>
-            <a:off x="781628" y="3810000"/>
+            <a:off x="4591628" y="2159726"/>
             <a:ext cx="970972" cy="914400"/>
           </a:xfrm>
           <a:prstGeom prst="ellipse">
@@ -4804,13 +3485,13 @@
       </p:sp>
       <p:sp>
         <p:nvSpPr>
-          <p:cNvPr id="81" name="Oval 80"/>
+          <p:cNvPr id="82" name="Oval 81"/>
           <p:cNvSpPr/>
           <p:nvPr/>
         </p:nvSpPr>
         <p:spPr>
           <a:xfrm>
-            <a:off x="2968551" y="386137"/>
+            <a:off x="1469740" y="3810000"/>
             <a:ext cx="970972" cy="914400"/>
           </a:xfrm>
           <a:prstGeom prst="ellipse">
@@ -4862,15 +3543,7 @@
                   <a:schemeClr val="tx1"/>
                 </a:solidFill>
               </a:rPr>
-              <a:t>=0</a:t>
-            </a:r>
-            <a:r>
-              <a:rPr lang="en-US" sz="1400" dirty="0" smtClean="0">
-                <a:solidFill>
-                  <a:schemeClr val="tx1"/>
-                </a:solidFill>
-              </a:rPr>
-              <a:t>, </a:t>
+              <a:t>=0, </a:t>
             </a:r>
             <a:r>
               <a:rPr lang="en-US" sz="1400" i="1" dirty="0" smtClean="0">
@@ -4886,15 +3559,7 @@
                   <a:schemeClr val="tx1"/>
                 </a:solidFill>
               </a:rPr>
-              <a:t>=0</a:t>
-            </a:r>
-            <a:r>
-              <a:rPr lang="en-US" sz="1400" dirty="0" smtClean="0">
-                <a:solidFill>
-                  <a:schemeClr val="tx1"/>
-                </a:solidFill>
-              </a:rPr>
-              <a:t>, </a:t>
+              <a:t>=1, </a:t>
             </a:r>
             <a:r>
               <a:rPr lang="en-US" sz="1400" i="1" dirty="0" smtClean="0">
@@ -4910,7 +3575,7 @@
                   <a:schemeClr val="tx1"/>
                 </a:solidFill>
               </a:rPr>
-              <a:t>=0</a:t>
+              <a:t>=1</a:t>
             </a:r>
             <a:endParaRPr lang="en-US" sz="1400" dirty="0">
               <a:solidFill>
@@ -4922,13 +3587,13 @@
       </p:sp>
       <p:sp>
         <p:nvSpPr>
-          <p:cNvPr id="82" name="Oval 81"/>
+          <p:cNvPr id="84" name="Oval 83"/>
           <p:cNvSpPr/>
           <p:nvPr/>
         </p:nvSpPr>
         <p:spPr>
           <a:xfrm>
-            <a:off x="2968551" y="1529137"/>
+            <a:off x="3620656" y="3810000"/>
             <a:ext cx="970972" cy="914400"/>
           </a:xfrm>
           <a:prstGeom prst="ellipse">
@@ -4980,15 +3645,7 @@
                   <a:schemeClr val="tx1"/>
                 </a:solidFill>
               </a:rPr>
-              <a:t>=0</a:t>
-            </a:r>
-            <a:r>
-              <a:rPr lang="en-US" sz="1400" dirty="0" smtClean="0">
-                <a:solidFill>
-                  <a:schemeClr val="tx1"/>
-                </a:solidFill>
-              </a:rPr>
-              <a:t>, </a:t>
+              <a:t>=1, </a:t>
             </a:r>
             <a:r>
               <a:rPr lang="en-US" sz="1400" i="1" dirty="0" smtClean="0">
@@ -5030,222 +3687,992 @@
           </a:p>
         </p:txBody>
       </p:sp>
-      <p:sp>
-        <p:nvSpPr>
-          <p:cNvPr id="83" name="Oval 82"/>
-          <p:cNvSpPr/>
+      <p:cxnSp>
+        <p:nvCxnSpPr>
+          <p:cNvPr id="32" name="Curved Connector 31"/>
+          <p:cNvCxnSpPr>
+            <a:stCxn id="78" idx="1"/>
+            <a:endCxn id="50" idx="2"/>
+          </p:cNvCxnSpPr>
           <p:nvPr/>
-        </p:nvSpPr>
+        </p:nvCxnSpPr>
         <p:spPr>
-          <a:xfrm>
-            <a:off x="2968551" y="2672137"/>
-            <a:ext cx="970972" cy="914400"/>
+          <a:xfrm rot="5400000" flipH="1" flipV="1">
+            <a:off x="404922" y="1226642"/>
+            <a:ext cx="1300860" cy="828776"/>
           </a:xfrm>
-          <a:prstGeom prst="ellipse">
+          <a:prstGeom prst="curvedConnector2">
             <a:avLst/>
           </a:prstGeom>
-          <a:solidFill>
-            <a:schemeClr val="bg1">
-              <a:lumMod val="85000"/>
-            </a:schemeClr>
-          </a:solidFill>
-          <a:ln>
+          <a:ln w="15875">
             <a:solidFill>
               <a:schemeClr val="tx1"/>
             </a:solidFill>
+            <a:tailEnd type="triangle"/>
           </a:ln>
         </p:spPr>
         <p:style>
-          <a:lnRef idx="2">
-            <a:schemeClr val="accent1">
-              <a:shade val="50000"/>
-            </a:schemeClr>
+          <a:lnRef idx="1">
+            <a:schemeClr val="accent1"/>
           </a:lnRef>
-          <a:fillRef idx="1">
+          <a:fillRef idx="0">
             <a:schemeClr val="accent1"/>
           </a:fillRef>
           <a:effectRef idx="0">
             <a:schemeClr val="accent1"/>
           </a:effectRef>
           <a:fontRef idx="minor">
-            <a:schemeClr val="lt1"/>
+            <a:schemeClr val="tx1"/>
           </a:fontRef>
         </p:style>
-        <p:txBody>
-          <a:bodyPr rtlCol="0" anchor="ctr"/>
-          <a:lstStyle/>
-          <a:p>
-            <a:pPr algn="ctr"/>
-            <a:r>
-              <a:rPr lang="en-US" sz="1400" i="1" dirty="0" smtClean="0">
-                <a:solidFill>
-                  <a:schemeClr val="tx1"/>
-                </a:solidFill>
-              </a:rPr>
-              <a:t>X</a:t>
-            </a:r>
-            <a:r>
-              <a:rPr lang="en-US" sz="1400" dirty="0" smtClean="0">
-                <a:solidFill>
-                  <a:schemeClr val="tx1"/>
-                </a:solidFill>
-              </a:rPr>
-              <a:t>=1, </a:t>
-            </a:r>
-            <a:r>
-              <a:rPr lang="en-US" sz="1400" i="1" dirty="0" smtClean="0">
-                <a:solidFill>
-                  <a:schemeClr val="tx1"/>
-                </a:solidFill>
-              </a:rPr>
-              <a:t>U</a:t>
-            </a:r>
-            <a:r>
-              <a:rPr lang="en-US" sz="1400" dirty="0" smtClean="0">
-                <a:solidFill>
-                  <a:schemeClr val="tx1"/>
-                </a:solidFill>
-              </a:rPr>
-              <a:t>=0</a:t>
-            </a:r>
-            <a:r>
-              <a:rPr lang="en-US" sz="1400" dirty="0" smtClean="0">
-                <a:solidFill>
-                  <a:schemeClr val="tx1"/>
-                </a:solidFill>
-              </a:rPr>
-              <a:t>, </a:t>
-            </a:r>
-            <a:r>
-              <a:rPr lang="en-US" sz="1400" i="1" dirty="0" smtClean="0">
-                <a:solidFill>
-                  <a:schemeClr val="tx1"/>
-                </a:solidFill>
-              </a:rPr>
-              <a:t>W</a:t>
-            </a:r>
-            <a:r>
-              <a:rPr lang="en-US" sz="1400" dirty="0" smtClean="0">
-                <a:solidFill>
-                  <a:schemeClr val="tx1"/>
-                </a:solidFill>
-              </a:rPr>
-              <a:t>=0</a:t>
-            </a:r>
-            <a:endParaRPr lang="en-US" sz="1400" dirty="0">
-              <a:solidFill>
-                <a:schemeClr val="tx1"/>
-              </a:solidFill>
-            </a:endParaRPr>
-          </a:p>
-        </p:txBody>
-      </p:sp>
-      <p:sp>
-        <p:nvSpPr>
-          <p:cNvPr id="84" name="Oval 83"/>
-          <p:cNvSpPr/>
+      </p:cxnSp>
+      <p:cxnSp>
+        <p:nvCxnSpPr>
+          <p:cNvPr id="36" name="Curved Connector 35"/>
+          <p:cNvCxnSpPr>
+            <a:stCxn id="82" idx="0"/>
+            <a:endCxn id="50" idx="2"/>
+          </p:cNvCxnSpPr>
           <p:nvPr/>
-        </p:nvSpPr>
+        </p:nvCxnSpPr>
         <p:spPr>
-          <a:xfrm>
-            <a:off x="2968551" y="3815137"/>
-            <a:ext cx="970972" cy="914400"/>
+          <a:xfrm rot="16200000" flipV="1">
+            <a:off x="302783" y="2157557"/>
+            <a:ext cx="2819400" cy="485486"/>
           </a:xfrm>
-          <a:prstGeom prst="ellipse">
-            <a:avLst/>
+          <a:prstGeom prst="curvedConnector4">
+            <a:avLst>
+              <a:gd name="adj1" fmla="val 15328"/>
+              <a:gd name="adj2" fmla="val 389248"/>
+            </a:avLst>
           </a:prstGeom>
-          <a:solidFill>
-            <a:schemeClr val="bg1">
-              <a:lumMod val="85000"/>
-            </a:schemeClr>
-          </a:solidFill>
-          <a:ln>
+          <a:ln w="15875">
             <a:solidFill>
               <a:schemeClr val="tx1"/>
             </a:solidFill>
+            <a:tailEnd type="triangle"/>
           </a:ln>
         </p:spPr>
         <p:style>
-          <a:lnRef idx="2">
-            <a:schemeClr val="accent1">
-              <a:shade val="50000"/>
-            </a:schemeClr>
+          <a:lnRef idx="1">
+            <a:schemeClr val="accent1"/>
           </a:lnRef>
-          <a:fillRef idx="1">
+          <a:fillRef idx="0">
             <a:schemeClr val="accent1"/>
           </a:fillRef>
           <a:effectRef idx="0">
             <a:schemeClr val="accent1"/>
           </a:effectRef>
           <a:fontRef idx="minor">
-            <a:schemeClr val="lt1"/>
+            <a:schemeClr val="tx1"/>
           </a:fontRef>
         </p:style>
-        <p:txBody>
-          <a:bodyPr rtlCol="0" anchor="ctr"/>
-          <a:lstStyle/>
-          <a:p>
-            <a:pPr algn="ctr"/>
-            <a:r>
-              <a:rPr lang="en-US" sz="1400" i="1" dirty="0" smtClean="0">
-                <a:solidFill>
-                  <a:schemeClr val="tx1"/>
-                </a:solidFill>
-              </a:rPr>
-              <a:t>X</a:t>
-            </a:r>
-            <a:r>
-              <a:rPr lang="en-US" sz="1400" dirty="0" smtClean="0">
-                <a:solidFill>
-                  <a:schemeClr val="tx1"/>
-                </a:solidFill>
-              </a:rPr>
-              <a:t>=1, </a:t>
-            </a:r>
-            <a:r>
-              <a:rPr lang="en-US" sz="1400" i="1" dirty="0" smtClean="0">
-                <a:solidFill>
-                  <a:schemeClr val="tx1"/>
-                </a:solidFill>
-              </a:rPr>
-              <a:t>U</a:t>
-            </a:r>
-            <a:r>
-              <a:rPr lang="en-US" sz="1400" dirty="0" smtClean="0">
-                <a:solidFill>
-                  <a:schemeClr val="tx1"/>
-                </a:solidFill>
-              </a:rPr>
-              <a:t>=1, </a:t>
-            </a:r>
-            <a:r>
-              <a:rPr lang="en-US" sz="1400" i="1" dirty="0" smtClean="0">
-                <a:solidFill>
-                  <a:schemeClr val="tx1"/>
-                </a:solidFill>
-              </a:rPr>
-              <a:t>W</a:t>
-            </a:r>
-            <a:r>
-              <a:rPr lang="en-US" sz="1400" dirty="0" smtClean="0">
-                <a:solidFill>
-                  <a:schemeClr val="tx1"/>
-                </a:solidFill>
-              </a:rPr>
-              <a:t>=1</a:t>
-            </a:r>
-            <a:endParaRPr lang="en-US" sz="1400" dirty="0">
-              <a:solidFill>
-                <a:schemeClr val="tx1"/>
-              </a:solidFill>
-            </a:endParaRPr>
-          </a:p>
-        </p:txBody>
-      </p:sp>
+      </p:cxnSp>
+      <p:cxnSp>
+        <p:nvCxnSpPr>
+          <p:cNvPr id="39" name="Curved Connector 38"/>
+          <p:cNvCxnSpPr>
+            <a:stCxn id="50" idx="4"/>
+            <a:endCxn id="50" idx="2"/>
+          </p:cNvCxnSpPr>
+          <p:nvPr/>
+        </p:nvCxnSpPr>
+        <p:spPr>
+          <a:xfrm rot="5400000" flipH="1">
+            <a:off x="1483883" y="976457"/>
+            <a:ext cx="457200" cy="485486"/>
+          </a:xfrm>
+          <a:prstGeom prst="curvedConnector4">
+            <a:avLst>
+              <a:gd name="adj1" fmla="val -50000"/>
+              <a:gd name="adj2" fmla="val 147087"/>
+            </a:avLst>
+          </a:prstGeom>
+          <a:ln w="15875">
+            <a:solidFill>
+              <a:schemeClr val="tx1"/>
+            </a:solidFill>
+            <a:tailEnd type="triangle"/>
+          </a:ln>
+        </p:spPr>
+        <p:style>
+          <a:lnRef idx="1">
+            <a:schemeClr val="accent1"/>
+          </a:lnRef>
+          <a:fillRef idx="0">
+            <a:schemeClr val="accent1"/>
+          </a:fillRef>
+          <a:effectRef idx="0">
+            <a:schemeClr val="accent1"/>
+          </a:effectRef>
+          <a:fontRef idx="minor">
+            <a:schemeClr val="tx1"/>
+          </a:fontRef>
+        </p:style>
+      </p:cxnSp>
+      <p:cxnSp>
+        <p:nvCxnSpPr>
+          <p:cNvPr id="53" name="Curved Connector 52"/>
+          <p:cNvCxnSpPr>
+            <a:stCxn id="50" idx="4"/>
+            <a:endCxn id="78" idx="7"/>
+          </p:cNvCxnSpPr>
+          <p:nvPr/>
+        </p:nvCxnSpPr>
+        <p:spPr>
+          <a:xfrm rot="5400000">
+            <a:off x="1219555" y="1555789"/>
+            <a:ext cx="843660" cy="627682"/>
+          </a:xfrm>
+          <a:prstGeom prst="curvedConnector3">
+            <a:avLst>
+              <a:gd name="adj1" fmla="val 50000"/>
+            </a:avLst>
+          </a:prstGeom>
+          <a:ln w="15875">
+            <a:solidFill>
+              <a:schemeClr val="tx1"/>
+            </a:solidFill>
+            <a:tailEnd type="triangle"/>
+          </a:ln>
+        </p:spPr>
+        <p:style>
+          <a:lnRef idx="1">
+            <a:schemeClr val="accent1"/>
+          </a:lnRef>
+          <a:fillRef idx="0">
+            <a:schemeClr val="accent1"/>
+          </a:fillRef>
+          <a:effectRef idx="0">
+            <a:schemeClr val="accent1"/>
+          </a:effectRef>
+          <a:fontRef idx="minor">
+            <a:schemeClr val="tx1"/>
+          </a:fontRef>
+        </p:style>
+      </p:cxnSp>
+      <p:cxnSp>
+        <p:nvCxnSpPr>
+          <p:cNvPr id="56" name="Curved Connector 55"/>
+          <p:cNvCxnSpPr>
+            <a:stCxn id="78" idx="1"/>
+            <a:endCxn id="78" idx="7"/>
+          </p:cNvCxnSpPr>
+          <p:nvPr/>
+        </p:nvCxnSpPr>
+        <p:spPr>
+          <a:xfrm rot="5400000" flipH="1" flipV="1">
+            <a:off x="984254" y="1948170"/>
+            <a:ext cx="12700" cy="686580"/>
+          </a:xfrm>
+          <a:prstGeom prst="curvedConnector3">
+            <a:avLst>
+              <a:gd name="adj1" fmla="val 4294417"/>
+            </a:avLst>
+          </a:prstGeom>
+          <a:ln w="15875">
+            <a:solidFill>
+              <a:schemeClr val="tx1"/>
+            </a:solidFill>
+            <a:tailEnd type="triangle"/>
+          </a:ln>
+        </p:spPr>
+        <p:style>
+          <a:lnRef idx="1">
+            <a:schemeClr val="accent1"/>
+          </a:lnRef>
+          <a:fillRef idx="0">
+            <a:schemeClr val="accent1"/>
+          </a:fillRef>
+          <a:effectRef idx="0">
+            <a:schemeClr val="accent1"/>
+          </a:effectRef>
+          <a:fontRef idx="minor">
+            <a:schemeClr val="tx1"/>
+          </a:fontRef>
+        </p:style>
+      </p:cxnSp>
+      <p:cxnSp>
+        <p:nvCxnSpPr>
+          <p:cNvPr id="60" name="Curved Connector 59"/>
+          <p:cNvCxnSpPr>
+            <a:stCxn id="82" idx="0"/>
+            <a:endCxn id="78" idx="5"/>
+          </p:cNvCxnSpPr>
+          <p:nvPr/>
+        </p:nvCxnSpPr>
+        <p:spPr>
+          <a:xfrm rot="16200000" flipV="1">
+            <a:off x="1205404" y="3060178"/>
+            <a:ext cx="871962" cy="627682"/>
+          </a:xfrm>
+          <a:prstGeom prst="curvedConnector3">
+            <a:avLst>
+              <a:gd name="adj1" fmla="val 50000"/>
+            </a:avLst>
+          </a:prstGeom>
+          <a:ln w="15875">
+            <a:solidFill>
+              <a:schemeClr val="tx1"/>
+            </a:solidFill>
+            <a:tailEnd type="triangle"/>
+          </a:ln>
+        </p:spPr>
+        <p:style>
+          <a:lnRef idx="1">
+            <a:schemeClr val="accent1"/>
+          </a:lnRef>
+          <a:fillRef idx="0">
+            <a:schemeClr val="accent1"/>
+          </a:fillRef>
+          <a:effectRef idx="0">
+            <a:schemeClr val="accent1"/>
+          </a:effectRef>
+          <a:fontRef idx="minor">
+            <a:schemeClr val="tx1"/>
+          </a:fontRef>
+        </p:style>
+      </p:cxnSp>
+      <p:cxnSp>
+        <p:nvCxnSpPr>
+          <p:cNvPr id="72" name="Curved Connector 71"/>
+          <p:cNvCxnSpPr>
+            <a:stCxn id="82" idx="0"/>
+            <a:endCxn id="79" idx="2"/>
+          </p:cNvCxnSpPr>
+          <p:nvPr/>
+        </p:nvCxnSpPr>
+        <p:spPr>
+          <a:xfrm rot="5400000" flipH="1" flipV="1">
+            <a:off x="1378241" y="1567585"/>
+            <a:ext cx="2819400" cy="1665430"/>
+          </a:xfrm>
+          <a:prstGeom prst="curvedConnector2">
+            <a:avLst/>
+          </a:prstGeom>
+          <a:ln w="15875">
+            <a:solidFill>
+              <a:schemeClr val="tx1"/>
+            </a:solidFill>
+            <a:tailEnd type="triangle"/>
+          </a:ln>
+        </p:spPr>
+        <p:style>
+          <a:lnRef idx="1">
+            <a:schemeClr val="accent1"/>
+          </a:lnRef>
+          <a:fillRef idx="0">
+            <a:schemeClr val="accent1"/>
+          </a:fillRef>
+          <a:effectRef idx="0">
+            <a:schemeClr val="accent1"/>
+          </a:effectRef>
+          <a:fontRef idx="minor">
+            <a:schemeClr val="tx1"/>
+          </a:fontRef>
+        </p:style>
+      </p:cxnSp>
+      <p:cxnSp>
+        <p:nvCxnSpPr>
+          <p:cNvPr id="75" name="Curved Connector 74"/>
+          <p:cNvCxnSpPr>
+            <a:stCxn id="78" idx="1"/>
+            <a:endCxn id="79" idx="1"/>
+          </p:cNvCxnSpPr>
+          <p:nvPr/>
+        </p:nvCxnSpPr>
+        <p:spPr>
+          <a:xfrm rot="5400000" flipH="1" flipV="1">
+            <a:off x="1389834" y="-81558"/>
+            <a:ext cx="1624149" cy="3121888"/>
+          </a:xfrm>
+          <a:prstGeom prst="curvedConnector3">
+            <a:avLst>
+              <a:gd name="adj1" fmla="val 136797"/>
+            </a:avLst>
+          </a:prstGeom>
+          <a:ln w="15875">
+            <a:solidFill>
+              <a:schemeClr val="tx1"/>
+            </a:solidFill>
+            <a:tailEnd type="triangle"/>
+          </a:ln>
+        </p:spPr>
+        <p:style>
+          <a:lnRef idx="1">
+            <a:schemeClr val="accent1"/>
+          </a:lnRef>
+          <a:fillRef idx="0">
+            <a:schemeClr val="accent1"/>
+          </a:fillRef>
+          <a:effectRef idx="0">
+            <a:schemeClr val="accent1"/>
+          </a:effectRef>
+          <a:fontRef idx="minor">
+            <a:schemeClr val="tx1"/>
+          </a:fontRef>
+        </p:style>
+      </p:cxnSp>
+      <p:cxnSp>
+        <p:nvCxnSpPr>
+          <p:cNvPr id="81" name="Curved Connector 80"/>
+          <p:cNvCxnSpPr>
+            <a:stCxn id="50" idx="7"/>
+            <a:endCxn id="79" idx="1"/>
+          </p:cNvCxnSpPr>
+          <p:nvPr/>
+        </p:nvCxnSpPr>
+        <p:spPr>
+          <a:xfrm rot="5400000" flipH="1" flipV="1">
+            <a:off x="3030684" y="-64857"/>
+            <a:ext cx="12700" cy="1464336"/>
+          </a:xfrm>
+          <a:prstGeom prst="curvedConnector3">
+            <a:avLst>
+              <a:gd name="adj1" fmla="val 2031567"/>
+            </a:avLst>
+          </a:prstGeom>
+          <a:ln w="15875">
+            <a:solidFill>
+              <a:schemeClr val="tx1"/>
+            </a:solidFill>
+            <a:tailEnd type="triangle"/>
+          </a:ln>
+        </p:spPr>
+        <p:style>
+          <a:lnRef idx="1">
+            <a:schemeClr val="accent1"/>
+          </a:lnRef>
+          <a:fillRef idx="0">
+            <a:schemeClr val="accent1"/>
+          </a:fillRef>
+          <a:effectRef idx="0">
+            <a:schemeClr val="accent1"/>
+          </a:effectRef>
+          <a:fontRef idx="minor">
+            <a:schemeClr val="tx1"/>
+          </a:fontRef>
+        </p:style>
+      </p:cxnSp>
+      <p:cxnSp>
+        <p:nvCxnSpPr>
+          <p:cNvPr id="83" name="Curved Connector 82"/>
+          <p:cNvCxnSpPr>
+            <a:stCxn id="50" idx="4"/>
+            <a:endCxn id="80" idx="1"/>
+          </p:cNvCxnSpPr>
+          <p:nvPr/>
+        </p:nvCxnSpPr>
+        <p:spPr>
+          <a:xfrm rot="16200000" flipH="1">
+            <a:off x="2921607" y="481419"/>
+            <a:ext cx="845837" cy="2778598"/>
+          </a:xfrm>
+          <a:prstGeom prst="curvedConnector3">
+            <a:avLst>
+              <a:gd name="adj1" fmla="val 50000"/>
+            </a:avLst>
+          </a:prstGeom>
+          <a:ln w="15875">
+            <a:solidFill>
+              <a:schemeClr val="tx1"/>
+            </a:solidFill>
+            <a:tailEnd type="triangle"/>
+          </a:ln>
+        </p:spPr>
+        <p:style>
+          <a:lnRef idx="1">
+            <a:schemeClr val="accent1"/>
+          </a:lnRef>
+          <a:fillRef idx="0">
+            <a:schemeClr val="accent1"/>
+          </a:fillRef>
+          <a:effectRef idx="0">
+            <a:schemeClr val="accent1"/>
+          </a:effectRef>
+          <a:fontRef idx="minor">
+            <a:schemeClr val="tx1"/>
+          </a:fontRef>
+        </p:style>
+      </p:cxnSp>
+      <p:cxnSp>
+        <p:nvCxnSpPr>
+          <p:cNvPr id="88" name="Curved Connector 87"/>
+          <p:cNvCxnSpPr>
+            <a:stCxn id="78" idx="6"/>
+            <a:endCxn id="80" idx="1"/>
+          </p:cNvCxnSpPr>
+          <p:nvPr/>
+        </p:nvCxnSpPr>
+        <p:spPr>
+          <a:xfrm flipV="1">
+            <a:off x="1469740" y="2293637"/>
+            <a:ext cx="3264084" cy="321112"/>
+          </a:xfrm>
+          <a:prstGeom prst="curvedConnector4">
+            <a:avLst>
+              <a:gd name="adj1" fmla="val 36616"/>
+              <a:gd name="adj2" fmla="val 115938"/>
+            </a:avLst>
+          </a:prstGeom>
+          <a:ln w="15875">
+            <a:solidFill>
+              <a:schemeClr val="tx1"/>
+            </a:solidFill>
+            <a:tailEnd type="triangle"/>
+          </a:ln>
+        </p:spPr>
+        <p:style>
+          <a:lnRef idx="1">
+            <a:schemeClr val="accent1"/>
+          </a:lnRef>
+          <a:fillRef idx="0">
+            <a:schemeClr val="accent1"/>
+          </a:fillRef>
+          <a:effectRef idx="0">
+            <a:schemeClr val="accent1"/>
+          </a:effectRef>
+          <a:fontRef idx="minor">
+            <a:schemeClr val="tx1"/>
+          </a:fontRef>
+        </p:style>
+      </p:cxnSp>
+      <p:cxnSp>
+        <p:nvCxnSpPr>
+          <p:cNvPr id="89" name="Curved Connector 88"/>
+          <p:cNvCxnSpPr>
+            <a:stCxn id="82" idx="0"/>
+            <a:endCxn id="80" idx="3"/>
+          </p:cNvCxnSpPr>
+          <p:nvPr/>
+        </p:nvCxnSpPr>
+        <p:spPr>
+          <a:xfrm rot="5400000" flipH="1" flipV="1">
+            <a:off x="2909633" y="1985809"/>
+            <a:ext cx="869785" cy="2778598"/>
+          </a:xfrm>
+          <a:prstGeom prst="curvedConnector3">
+            <a:avLst>
+              <a:gd name="adj1" fmla="val 46996"/>
+            </a:avLst>
+          </a:prstGeom>
+          <a:ln w="15875">
+            <a:solidFill>
+              <a:schemeClr val="tx1"/>
+            </a:solidFill>
+            <a:tailEnd type="triangle"/>
+          </a:ln>
+        </p:spPr>
+        <p:style>
+          <a:lnRef idx="1">
+            <a:schemeClr val="accent1"/>
+          </a:lnRef>
+          <a:fillRef idx="0">
+            <a:schemeClr val="accent1"/>
+          </a:fillRef>
+          <a:effectRef idx="0">
+            <a:schemeClr val="accent1"/>
+          </a:effectRef>
+          <a:fontRef idx="minor">
+            <a:schemeClr val="tx1"/>
+          </a:fontRef>
+        </p:style>
+      </p:cxnSp>
+      <p:cxnSp>
+        <p:nvCxnSpPr>
+          <p:cNvPr id="100" name="Curved Connector 99"/>
+          <p:cNvCxnSpPr>
+            <a:stCxn id="79" idx="4"/>
+            <a:endCxn id="84" idx="6"/>
+          </p:cNvCxnSpPr>
+          <p:nvPr/>
+        </p:nvCxnSpPr>
+        <p:spPr>
+          <a:xfrm rot="16200000" flipH="1">
+            <a:off x="2939185" y="2614757"/>
+            <a:ext cx="2819400" cy="485486"/>
+          </a:xfrm>
+          <a:prstGeom prst="curvedConnector4">
+            <a:avLst>
+              <a:gd name="adj1" fmla="val 8224"/>
+              <a:gd name="adj2" fmla="val 396423"/>
+            </a:avLst>
+          </a:prstGeom>
+          <a:ln w="15875">
+            <a:solidFill>
+              <a:schemeClr val="tx1"/>
+            </a:solidFill>
+            <a:tailEnd type="triangle"/>
+          </a:ln>
+        </p:spPr>
+        <p:style>
+          <a:lnRef idx="1">
+            <a:schemeClr val="accent1"/>
+          </a:lnRef>
+          <a:fillRef idx="0">
+            <a:schemeClr val="accent1"/>
+          </a:fillRef>
+          <a:effectRef idx="0">
+            <a:schemeClr val="accent1"/>
+          </a:effectRef>
+          <a:fontRef idx="minor">
+            <a:schemeClr val="tx1"/>
+          </a:fontRef>
+        </p:style>
+      </p:cxnSp>
+      <p:cxnSp>
+        <p:nvCxnSpPr>
+          <p:cNvPr id="104" name="Curved Connector 103"/>
+          <p:cNvCxnSpPr>
+            <a:stCxn id="80" idx="5"/>
+            <a:endCxn id="84" idx="6"/>
+          </p:cNvCxnSpPr>
+          <p:nvPr/>
+        </p:nvCxnSpPr>
+        <p:spPr>
+          <a:xfrm rot="5400000">
+            <a:off x="4342524" y="3189319"/>
+            <a:ext cx="1326985" cy="828776"/>
+          </a:xfrm>
+          <a:prstGeom prst="curvedConnector2">
+            <a:avLst/>
+          </a:prstGeom>
+          <a:ln w="15875">
+            <a:solidFill>
+              <a:schemeClr val="tx1"/>
+            </a:solidFill>
+            <a:tailEnd type="triangle"/>
+          </a:ln>
+        </p:spPr>
+        <p:style>
+          <a:lnRef idx="1">
+            <a:schemeClr val="accent1"/>
+          </a:lnRef>
+          <a:fillRef idx="0">
+            <a:schemeClr val="accent1"/>
+          </a:fillRef>
+          <a:effectRef idx="0">
+            <a:schemeClr val="accent1"/>
+          </a:effectRef>
+          <a:fontRef idx="minor">
+            <a:schemeClr val="tx1"/>
+          </a:fontRef>
+        </p:style>
+      </p:cxnSp>
+      <p:cxnSp>
+        <p:nvCxnSpPr>
+          <p:cNvPr id="109" name="Curved Connector 108"/>
+          <p:cNvCxnSpPr>
+            <a:stCxn id="84" idx="0"/>
+            <a:endCxn id="84" idx="6"/>
+          </p:cNvCxnSpPr>
+          <p:nvPr/>
+        </p:nvCxnSpPr>
+        <p:spPr>
+          <a:xfrm rot="16200000" flipH="1">
+            <a:off x="4120285" y="3795857"/>
+            <a:ext cx="457200" cy="485486"/>
+          </a:xfrm>
+          <a:prstGeom prst="curvedConnector4">
+            <a:avLst>
+              <a:gd name="adj1" fmla="val -50000"/>
+              <a:gd name="adj2" fmla="val 147087"/>
+            </a:avLst>
+          </a:prstGeom>
+          <a:ln w="15875">
+            <a:solidFill>
+              <a:schemeClr val="tx1"/>
+            </a:solidFill>
+            <a:tailEnd type="triangle"/>
+          </a:ln>
+        </p:spPr>
+        <p:style>
+          <a:lnRef idx="1">
+            <a:schemeClr val="accent1"/>
+          </a:lnRef>
+          <a:fillRef idx="0">
+            <a:schemeClr val="accent1"/>
+          </a:fillRef>
+          <a:effectRef idx="0">
+            <a:schemeClr val="accent1"/>
+          </a:effectRef>
+          <a:fontRef idx="minor">
+            <a:schemeClr val="tx1"/>
+          </a:fontRef>
+        </p:style>
+      </p:cxnSp>
+      <p:cxnSp>
+        <p:nvCxnSpPr>
+          <p:cNvPr id="112" name="Curved Connector 111"/>
+          <p:cNvCxnSpPr>
+            <a:stCxn id="84" idx="0"/>
+            <a:endCxn id="80" idx="3"/>
+          </p:cNvCxnSpPr>
+          <p:nvPr/>
+        </p:nvCxnSpPr>
+        <p:spPr>
+          <a:xfrm rot="5400000" flipH="1" flipV="1">
+            <a:off x="3985091" y="3061267"/>
+            <a:ext cx="869785" cy="627682"/>
+          </a:xfrm>
+          <a:prstGeom prst="curvedConnector3">
+            <a:avLst>
+              <a:gd name="adj1" fmla="val 50000"/>
+            </a:avLst>
+          </a:prstGeom>
+          <a:ln w="15875">
+            <a:solidFill>
+              <a:schemeClr val="tx1"/>
+            </a:solidFill>
+            <a:tailEnd type="triangle"/>
+          </a:ln>
+        </p:spPr>
+        <p:style>
+          <a:lnRef idx="1">
+            <a:schemeClr val="accent1"/>
+          </a:lnRef>
+          <a:fillRef idx="0">
+            <a:schemeClr val="accent1"/>
+          </a:fillRef>
+          <a:effectRef idx="0">
+            <a:schemeClr val="accent1"/>
+          </a:effectRef>
+          <a:fontRef idx="minor">
+            <a:schemeClr val="tx1"/>
+          </a:fontRef>
+        </p:style>
+      </p:cxnSp>
+      <p:cxnSp>
+        <p:nvCxnSpPr>
+          <p:cNvPr id="115" name="Curved Connector 114"/>
+          <p:cNvCxnSpPr>
+            <a:stCxn id="79" idx="4"/>
+            <a:endCxn id="80" idx="1"/>
+          </p:cNvCxnSpPr>
+          <p:nvPr/>
+        </p:nvCxnSpPr>
+        <p:spPr>
+          <a:xfrm rot="16200000" flipH="1">
+            <a:off x="3997065" y="1556877"/>
+            <a:ext cx="845837" cy="627682"/>
+          </a:xfrm>
+          <a:prstGeom prst="curvedConnector3">
+            <a:avLst>
+              <a:gd name="adj1" fmla="val 50000"/>
+            </a:avLst>
+          </a:prstGeom>
+          <a:ln w="15875">
+            <a:solidFill>
+              <a:schemeClr val="tx1"/>
+            </a:solidFill>
+            <a:tailEnd type="triangle"/>
+          </a:ln>
+        </p:spPr>
+        <p:style>
+          <a:lnRef idx="1">
+            <a:schemeClr val="accent1"/>
+          </a:lnRef>
+          <a:fillRef idx="0">
+            <a:schemeClr val="accent1"/>
+          </a:fillRef>
+          <a:effectRef idx="0">
+            <a:schemeClr val="accent1"/>
+          </a:effectRef>
+          <a:fontRef idx="minor">
+            <a:schemeClr val="tx1"/>
+          </a:fontRef>
+        </p:style>
+      </p:cxnSp>
+      <p:cxnSp>
+        <p:nvCxnSpPr>
+          <p:cNvPr id="118" name="Curved Connector 117"/>
+          <p:cNvCxnSpPr>
+            <a:stCxn id="80" idx="5"/>
+            <a:endCxn id="80" idx="3"/>
+          </p:cNvCxnSpPr>
+          <p:nvPr/>
+        </p:nvCxnSpPr>
+        <p:spPr>
+          <a:xfrm rot="5400000">
+            <a:off x="5077114" y="2596925"/>
+            <a:ext cx="12700" cy="686580"/>
+          </a:xfrm>
+          <a:prstGeom prst="curvedConnector3">
+            <a:avLst>
+              <a:gd name="adj1" fmla="val 3814417"/>
+            </a:avLst>
+          </a:prstGeom>
+          <a:ln w="15875">
+            <a:solidFill>
+              <a:schemeClr val="tx1"/>
+            </a:solidFill>
+            <a:tailEnd type="triangle"/>
+          </a:ln>
+        </p:spPr>
+        <p:style>
+          <a:lnRef idx="1">
+            <a:schemeClr val="accent1"/>
+          </a:lnRef>
+          <a:fillRef idx="0">
+            <a:schemeClr val="accent1"/>
+          </a:fillRef>
+          <a:effectRef idx="0">
+            <a:schemeClr val="accent1"/>
+          </a:effectRef>
+          <a:fontRef idx="minor">
+            <a:schemeClr val="tx1"/>
+          </a:fontRef>
+        </p:style>
+      </p:cxnSp>
+      <p:cxnSp>
+        <p:nvCxnSpPr>
+          <p:cNvPr id="122" name="Curved Connector 121"/>
+          <p:cNvCxnSpPr>
+            <a:stCxn id="79" idx="4"/>
+            <a:endCxn id="82" idx="6"/>
+          </p:cNvCxnSpPr>
+          <p:nvPr/>
+        </p:nvCxnSpPr>
+        <p:spPr>
+          <a:xfrm rot="5400000">
+            <a:off x="1863727" y="2024785"/>
+            <a:ext cx="2819400" cy="1665430"/>
+          </a:xfrm>
+          <a:prstGeom prst="curvedConnector2">
+            <a:avLst/>
+          </a:prstGeom>
+          <a:ln w="15875">
+            <a:solidFill>
+              <a:schemeClr val="tx1"/>
+            </a:solidFill>
+            <a:tailEnd type="triangle"/>
+          </a:ln>
+        </p:spPr>
+        <p:style>
+          <a:lnRef idx="1">
+            <a:schemeClr val="accent1"/>
+          </a:lnRef>
+          <a:fillRef idx="0">
+            <a:schemeClr val="accent1"/>
+          </a:fillRef>
+          <a:effectRef idx="0">
+            <a:schemeClr val="accent1"/>
+          </a:effectRef>
+          <a:fontRef idx="minor">
+            <a:schemeClr val="tx1"/>
+          </a:fontRef>
+        </p:style>
+      </p:cxnSp>
+      <p:cxnSp>
+        <p:nvCxnSpPr>
+          <p:cNvPr id="140" name="Curved Connector 139"/>
+          <p:cNvCxnSpPr>
+            <a:stCxn id="80" idx="5"/>
+            <a:endCxn id="82" idx="5"/>
+          </p:cNvCxnSpPr>
+          <p:nvPr/>
+        </p:nvCxnSpPr>
+        <p:spPr>
+          <a:xfrm rot="5400000">
+            <a:off x="3034323" y="2204408"/>
+            <a:ext cx="1650274" cy="3121888"/>
+          </a:xfrm>
+          <a:prstGeom prst="curvedConnector3">
+            <a:avLst>
+              <a:gd name="adj1" fmla="val 131993"/>
+            </a:avLst>
+          </a:prstGeom>
+          <a:ln w="15875">
+            <a:solidFill>
+              <a:schemeClr val="tx1"/>
+            </a:solidFill>
+            <a:tailEnd type="triangle"/>
+          </a:ln>
+        </p:spPr>
+        <p:style>
+          <a:lnRef idx="1">
+            <a:schemeClr val="accent1"/>
+          </a:lnRef>
+          <a:fillRef idx="0">
+            <a:schemeClr val="accent1"/>
+          </a:fillRef>
+          <a:effectRef idx="0">
+            <a:schemeClr val="accent1"/>
+          </a:effectRef>
+          <a:fontRef idx="minor">
+            <a:schemeClr val="tx1"/>
+          </a:fontRef>
+        </p:style>
+      </p:cxnSp>
+      <p:cxnSp>
+        <p:nvCxnSpPr>
+          <p:cNvPr id="143" name="Curved Connector 142"/>
+          <p:cNvCxnSpPr>
+            <a:stCxn id="84" idx="3"/>
+            <a:endCxn id="82" idx="5"/>
+          </p:cNvCxnSpPr>
+          <p:nvPr/>
+        </p:nvCxnSpPr>
+        <p:spPr>
+          <a:xfrm rot="5400000">
+            <a:off x="3030684" y="3858321"/>
+            <a:ext cx="12700" cy="1464336"/>
+          </a:xfrm>
+          <a:prstGeom prst="curvedConnector3">
+            <a:avLst>
+              <a:gd name="adj1" fmla="val 1414417"/>
+            </a:avLst>
+          </a:prstGeom>
+          <a:ln w="15875">
+            <a:solidFill>
+              <a:schemeClr val="tx1"/>
+            </a:solidFill>
+            <a:tailEnd type="triangle"/>
+          </a:ln>
+        </p:spPr>
+        <p:style>
+          <a:lnRef idx="1">
+            <a:schemeClr val="accent1"/>
+          </a:lnRef>
+          <a:fillRef idx="0">
+            <a:schemeClr val="accent1"/>
+          </a:fillRef>
+          <a:effectRef idx="0">
+            <a:schemeClr val="accent1"/>
+          </a:effectRef>
+          <a:fontRef idx="minor">
+            <a:schemeClr val="tx1"/>
+          </a:fontRef>
+        </p:style>
+      </p:cxnSp>
+      <p:cxnSp>
+        <p:nvCxnSpPr>
+          <p:cNvPr id="154" name="Curved Connector 153"/>
+          <p:cNvCxnSpPr>
+            <a:stCxn id="79" idx="4"/>
+            <a:endCxn id="78" idx="7"/>
+          </p:cNvCxnSpPr>
+          <p:nvPr/>
+        </p:nvCxnSpPr>
+        <p:spPr>
+          <a:xfrm rot="5400000">
+            <a:off x="2295013" y="480331"/>
+            <a:ext cx="843660" cy="2778598"/>
+          </a:xfrm>
+          <a:prstGeom prst="curvedConnector3">
+            <a:avLst>
+              <a:gd name="adj1" fmla="val 39678"/>
+            </a:avLst>
+          </a:prstGeom>
+          <a:ln w="15875">
+            <a:solidFill>
+              <a:schemeClr val="tx1"/>
+            </a:solidFill>
+            <a:tailEnd type="triangle"/>
+          </a:ln>
+        </p:spPr>
+        <p:style>
+          <a:lnRef idx="1">
+            <a:schemeClr val="accent1"/>
+          </a:lnRef>
+          <a:fillRef idx="0">
+            <a:schemeClr val="accent1"/>
+          </a:fillRef>
+          <a:effectRef idx="0">
+            <a:schemeClr val="accent1"/>
+          </a:effectRef>
+          <a:fontRef idx="minor">
+            <a:schemeClr val="tx1"/>
+          </a:fontRef>
+        </p:style>
+      </p:cxnSp>
+      <p:cxnSp>
+        <p:nvCxnSpPr>
+          <p:cNvPr id="158" name="Curved Connector 157"/>
+          <p:cNvCxnSpPr>
+            <a:stCxn id="80" idx="2"/>
+            <a:endCxn id="78" idx="5"/>
+          </p:cNvCxnSpPr>
+          <p:nvPr/>
+        </p:nvCxnSpPr>
+        <p:spPr>
+          <a:xfrm rot="10800000" flipV="1">
+            <a:off x="1327544" y="2616926"/>
+            <a:ext cx="3264084" cy="321112"/>
+          </a:xfrm>
+          <a:prstGeom prst="curvedConnector4">
+            <a:avLst>
+              <a:gd name="adj1" fmla="val 36616"/>
+              <a:gd name="adj2" fmla="val 118650"/>
+            </a:avLst>
+          </a:prstGeom>
+          <a:ln w="15875">
+            <a:solidFill>
+              <a:schemeClr val="tx1"/>
+            </a:solidFill>
+            <a:tailEnd type="triangle"/>
+          </a:ln>
+        </p:spPr>
+        <p:style>
+          <a:lnRef idx="1">
+            <a:schemeClr val="accent1"/>
+          </a:lnRef>
+          <a:fillRef idx="0">
+            <a:schemeClr val="accent1"/>
+          </a:fillRef>
+          <a:effectRef idx="0">
+            <a:schemeClr val="accent1"/>
+          </a:effectRef>
+          <a:fontRef idx="minor">
+            <a:schemeClr val="tx1"/>
+          </a:fontRef>
+        </p:style>
+      </p:cxnSp>
+      <p:cxnSp>
+        <p:nvCxnSpPr>
+          <p:cNvPr id="162" name="Curved Connector 161"/>
+          <p:cNvCxnSpPr>
+            <a:stCxn id="84" idx="0"/>
+            <a:endCxn id="78" idx="5"/>
+          </p:cNvCxnSpPr>
+          <p:nvPr/>
+        </p:nvCxnSpPr>
+        <p:spPr>
+          <a:xfrm rot="16200000" flipV="1">
+            <a:off x="2280862" y="1984720"/>
+            <a:ext cx="871962" cy="2778598"/>
+          </a:xfrm>
+          <a:prstGeom prst="curvedConnector3">
+            <a:avLst>
+              <a:gd name="adj1" fmla="val 66978"/>
+            </a:avLst>
+          </a:prstGeom>
+          <a:ln w="15875">
+            <a:solidFill>
+              <a:schemeClr val="tx1"/>
+            </a:solidFill>
+            <a:tailEnd type="triangle"/>
+          </a:ln>
+        </p:spPr>
+        <p:style>
+          <a:lnRef idx="1">
+            <a:schemeClr val="accent1"/>
+          </a:lnRef>
+          <a:fillRef idx="0">
+            <a:schemeClr val="accent1"/>
+          </a:fillRef>
+          <a:effectRef idx="0">
+            <a:schemeClr val="accent1"/>
+          </a:effectRef>
+          <a:fontRef idx="minor">
+            <a:schemeClr val="tx1"/>
+          </a:fontRef>
+        </p:style>
+      </p:cxnSp>
     </p:spTree>
     <p:extLst>
       <p:ext uri="{BB962C8B-B14F-4D97-AF65-F5344CB8AC3E}">
-        <p14:creationId xmlns:p14="http://schemas.microsoft.com/office/powerpoint/2010/main" val="3118385098"/>
+        <p14:creationId xmlns:p14="http://schemas.microsoft.com/office/powerpoint/2010/main" val="783433975"/>
       </p:ext>
     </p:extLst>
   </p:cSld>
@@ -5286,7 +4713,7 @@
                                           </p:stCondLst>
                                         </p:cTn>
                                         <p:tgtEl>
-                                          <p:spTgt spid="12"/>
+                                          <p:spTgt spid="50"/>
                                         </p:tgtEl>
                                         <p:attrNameLst>
                                           <p:attrName>style.visibility</p:attrName>
@@ -5299,21 +4726,39 @@
                                   </p:childTnLst>
                                 </p:cTn>
                               </p:par>
+                            </p:childTnLst>
+                          </p:cTn>
+                        </p:par>
+                      </p:childTnLst>
+                    </p:cTn>
+                  </p:par>
+                  <p:par>
+                    <p:cTn id="7" fill="hold">
+                      <p:stCondLst>
+                        <p:cond delay="indefinite"/>
+                      </p:stCondLst>
+                      <p:childTnLst>
+                        <p:par>
+                          <p:cTn id="8" fill="hold">
+                            <p:stCondLst>
+                              <p:cond delay="0"/>
+                            </p:stCondLst>
+                            <p:childTnLst>
                               <p:par>
-                                <p:cTn id="7" presetID="1" presetClass="entr" presetSubtype="0" fill="hold" grpId="0" nodeType="withEffect">
+                                <p:cTn id="9" presetID="1" presetClass="entr" presetSubtype="0" fill="hold" grpId="0" nodeType="clickEffect">
                                   <p:stCondLst>
                                     <p:cond delay="0"/>
                                   </p:stCondLst>
                                   <p:childTnLst>
                                     <p:set>
                                       <p:cBhvr>
-                                        <p:cTn id="8" dur="1" fill="hold">
+                                        <p:cTn id="10" dur="1" fill="hold">
                                           <p:stCondLst>
                                             <p:cond delay="0"/>
                                           </p:stCondLst>
                                         </p:cTn>
                                         <p:tgtEl>
-                                          <p:spTgt spid="13"/>
+                                          <p:spTgt spid="78"/>
                                         </p:tgtEl>
                                         <p:attrNameLst>
                                           <p:attrName>style.visibility</p:attrName>
@@ -5326,21 +4771,39 @@
                                   </p:childTnLst>
                                 </p:cTn>
                               </p:par>
+                            </p:childTnLst>
+                          </p:cTn>
+                        </p:par>
+                      </p:childTnLst>
+                    </p:cTn>
+                  </p:par>
+                  <p:par>
+                    <p:cTn id="11" fill="hold">
+                      <p:stCondLst>
+                        <p:cond delay="indefinite"/>
+                      </p:stCondLst>
+                      <p:childTnLst>
+                        <p:par>
+                          <p:cTn id="12" fill="hold">
+                            <p:stCondLst>
+                              <p:cond delay="0"/>
+                            </p:stCondLst>
+                            <p:childTnLst>
                               <p:par>
-                                <p:cTn id="9" presetID="1" presetClass="entr" presetSubtype="0" fill="hold" grpId="0" nodeType="withEffect">
+                                <p:cTn id="13" presetID="1" presetClass="entr" presetSubtype="0" fill="hold" grpId="0" nodeType="clickEffect">
                                   <p:stCondLst>
                                     <p:cond delay="0"/>
                                   </p:stCondLst>
                                   <p:childTnLst>
                                     <p:set>
                                       <p:cBhvr>
-                                        <p:cTn id="10" dur="1" fill="hold">
+                                        <p:cTn id="14" dur="1" fill="hold">
                                           <p:stCondLst>
                                             <p:cond delay="0"/>
                                           </p:stCondLst>
                                         </p:cTn>
                                         <p:tgtEl>
-                                          <p:spTgt spid="14"/>
+                                          <p:spTgt spid="79"/>
                                         </p:tgtEl>
                                         <p:attrNameLst>
                                           <p:attrName>style.visibility</p:attrName>
@@ -5353,21 +4816,39 @@
                                   </p:childTnLst>
                                 </p:cTn>
                               </p:par>
+                            </p:childTnLst>
+                          </p:cTn>
+                        </p:par>
+                      </p:childTnLst>
+                    </p:cTn>
+                  </p:par>
+                  <p:par>
+                    <p:cTn id="15" fill="hold">
+                      <p:stCondLst>
+                        <p:cond delay="indefinite"/>
+                      </p:stCondLst>
+                      <p:childTnLst>
+                        <p:par>
+                          <p:cTn id="16" fill="hold">
+                            <p:stCondLst>
+                              <p:cond delay="0"/>
+                            </p:stCondLst>
+                            <p:childTnLst>
                               <p:par>
-                                <p:cTn id="11" presetID="1" presetClass="entr" presetSubtype="0" fill="hold" grpId="0" nodeType="withEffect">
+                                <p:cTn id="17" presetID="1" presetClass="entr" presetSubtype="0" fill="hold" grpId="0" nodeType="clickEffect">
                                   <p:stCondLst>
                                     <p:cond delay="0"/>
                                   </p:stCondLst>
                                   <p:childTnLst>
                                     <p:set>
                                       <p:cBhvr>
-                                        <p:cTn id="12" dur="1" fill="hold">
+                                        <p:cTn id="18" dur="1" fill="hold">
                                           <p:stCondLst>
                                             <p:cond delay="0"/>
                                           </p:stCondLst>
                                         </p:cTn>
                                         <p:tgtEl>
-                                          <p:spTgt spid="15"/>
+                                          <p:spTgt spid="80"/>
                                         </p:tgtEl>
                                         <p:attrNameLst>
                                           <p:attrName>style.visibility</p:attrName>
@@ -5380,21 +4861,39 @@
                                   </p:childTnLst>
                                 </p:cTn>
                               </p:par>
+                            </p:childTnLst>
+                          </p:cTn>
+                        </p:par>
+                      </p:childTnLst>
+                    </p:cTn>
+                  </p:par>
+                  <p:par>
+                    <p:cTn id="19" fill="hold">
+                      <p:stCondLst>
+                        <p:cond delay="indefinite"/>
+                      </p:stCondLst>
+                      <p:childTnLst>
+                        <p:par>
+                          <p:cTn id="20" fill="hold">
+                            <p:stCondLst>
+                              <p:cond delay="0"/>
+                            </p:stCondLst>
+                            <p:childTnLst>
                               <p:par>
-                                <p:cTn id="13" presetID="1" presetClass="entr" presetSubtype="0" fill="hold" nodeType="withEffect">
+                                <p:cTn id="21" presetID="1" presetClass="entr" presetSubtype="0" fill="hold" grpId="0" nodeType="clickEffect">
                                   <p:stCondLst>
                                     <p:cond delay="0"/>
                                   </p:stCondLst>
                                   <p:childTnLst>
                                     <p:set>
                                       <p:cBhvr>
-                                        <p:cTn id="14" dur="1" fill="hold">
+                                        <p:cTn id="22" dur="1" fill="hold">
                                           <p:stCondLst>
                                             <p:cond delay="0"/>
                                           </p:stCondLst>
                                         </p:cTn>
                                         <p:tgtEl>
-                                          <p:spTgt spid="16"/>
+                                          <p:spTgt spid="82"/>
                                         </p:tgtEl>
                                         <p:attrNameLst>
                                           <p:attrName>style.visibility</p:attrName>
@@ -5407,143 +4906,26 @@
                                   </p:childTnLst>
                                 </p:cTn>
                               </p:par>
+                            </p:childTnLst>
+                          </p:cTn>
+                        </p:par>
+                      </p:childTnLst>
+                    </p:cTn>
+                  </p:par>
+                  <p:par>
+                    <p:cTn id="23" fill="hold">
+                      <p:stCondLst>
+                        <p:cond delay="indefinite"/>
+                      </p:stCondLst>
+                      <p:childTnLst>
+                        <p:par>
+                          <p:cTn id="24" fill="hold">
+                            <p:stCondLst>
+                              <p:cond delay="0"/>
+                            </p:stCondLst>
+                            <p:childTnLst>
                               <p:par>
-                                <p:cTn id="15" presetID="1" presetClass="entr" presetSubtype="0" fill="hold" nodeType="withEffect">
-                                  <p:stCondLst>
-                                    <p:cond delay="0"/>
-                                  </p:stCondLst>
-                                  <p:childTnLst>
-                                    <p:set>
-                                      <p:cBhvr>
-                                        <p:cTn id="16" dur="1" fill="hold">
-                                          <p:stCondLst>
-                                            <p:cond delay="0"/>
-                                          </p:stCondLst>
-                                        </p:cTn>
-                                        <p:tgtEl>
-                                          <p:spTgt spid="17"/>
-                                        </p:tgtEl>
-                                        <p:attrNameLst>
-                                          <p:attrName>style.visibility</p:attrName>
-                                        </p:attrNameLst>
-                                      </p:cBhvr>
-                                      <p:to>
-                                        <p:strVal val="visible"/>
-                                      </p:to>
-                                    </p:set>
-                                  </p:childTnLst>
-                                </p:cTn>
-                              </p:par>
-                              <p:par>
-                                <p:cTn id="17" presetID="1" presetClass="entr" presetSubtype="0" fill="hold" nodeType="withEffect">
-                                  <p:stCondLst>
-                                    <p:cond delay="0"/>
-                                  </p:stCondLst>
-                                  <p:childTnLst>
-                                    <p:set>
-                                      <p:cBhvr>
-                                        <p:cTn id="18" dur="1" fill="hold">
-                                          <p:stCondLst>
-                                            <p:cond delay="0"/>
-                                          </p:stCondLst>
-                                        </p:cTn>
-                                        <p:tgtEl>
-                                          <p:spTgt spid="18"/>
-                                        </p:tgtEl>
-                                        <p:attrNameLst>
-                                          <p:attrName>style.visibility</p:attrName>
-                                        </p:attrNameLst>
-                                      </p:cBhvr>
-                                      <p:to>
-                                        <p:strVal val="visible"/>
-                                      </p:to>
-                                    </p:set>
-                                  </p:childTnLst>
-                                </p:cTn>
-                              </p:par>
-                              <p:par>
-                                <p:cTn id="19" presetID="1" presetClass="entr" presetSubtype="0" fill="hold" nodeType="withEffect">
-                                  <p:stCondLst>
-                                    <p:cond delay="0"/>
-                                  </p:stCondLst>
-                                  <p:childTnLst>
-                                    <p:set>
-                                      <p:cBhvr>
-                                        <p:cTn id="20" dur="1" fill="hold">
-                                          <p:stCondLst>
-                                            <p:cond delay="0"/>
-                                          </p:stCondLst>
-                                        </p:cTn>
-                                        <p:tgtEl>
-                                          <p:spTgt spid="19"/>
-                                        </p:tgtEl>
-                                        <p:attrNameLst>
-                                          <p:attrName>style.visibility</p:attrName>
-                                        </p:attrNameLst>
-                                      </p:cBhvr>
-                                      <p:to>
-                                        <p:strVal val="visible"/>
-                                      </p:to>
-                                    </p:set>
-                                  </p:childTnLst>
-                                </p:cTn>
-                              </p:par>
-                              <p:par>
-                                <p:cTn id="21" presetID="1" presetClass="entr" presetSubtype="0" fill="hold" nodeType="withEffect">
-                                  <p:stCondLst>
-                                    <p:cond delay="0"/>
-                                  </p:stCondLst>
-                                  <p:childTnLst>
-                                    <p:set>
-                                      <p:cBhvr>
-                                        <p:cTn id="22" dur="1" fill="hold">
-                                          <p:stCondLst>
-                                            <p:cond delay="0"/>
-                                          </p:stCondLst>
-                                        </p:cTn>
-                                        <p:tgtEl>
-                                          <p:spTgt spid="20"/>
-                                        </p:tgtEl>
-                                        <p:attrNameLst>
-                                          <p:attrName>style.visibility</p:attrName>
-                                        </p:attrNameLst>
-                                      </p:cBhvr>
-                                      <p:to>
-                                        <p:strVal val="visible"/>
-                                      </p:to>
-                                    </p:set>
-                                  </p:childTnLst>
-                                </p:cTn>
-                              </p:par>
-                              <p:par>
-                                <p:cTn id="23" presetID="1" presetClass="entr" presetSubtype="0" fill="hold" nodeType="withEffect">
-                                  <p:stCondLst>
-                                    <p:cond delay="0"/>
-                                  </p:stCondLst>
-                                  <p:childTnLst>
-                                    <p:set>
-                                      <p:cBhvr>
-                                        <p:cTn id="24" dur="1" fill="hold">
-                                          <p:stCondLst>
-                                            <p:cond delay="0"/>
-                                          </p:stCondLst>
-                                        </p:cTn>
-                                        <p:tgtEl>
-                                          <p:spTgt spid="21"/>
-                                        </p:tgtEl>
-                                        <p:attrNameLst>
-                                          <p:attrName>style.visibility</p:attrName>
-                                        </p:attrNameLst>
-                                      </p:cBhvr>
-                                      <p:to>
-                                        <p:strVal val="visible"/>
-                                      </p:to>
-                                    </p:set>
-                                  </p:childTnLst>
-                                </p:cTn>
-                              </p:par>
-                              <p:par>
-                                <p:cTn id="25" presetID="1" presetClass="entr" presetSubtype="0" fill="hold" nodeType="withEffect">
+                                <p:cTn id="25" presetID="1" presetClass="entr" presetSubtype="0" fill="hold" grpId="0" nodeType="clickEffect">
                                   <p:stCondLst>
                                     <p:cond delay="0"/>
                                   </p:stCondLst>
@@ -5556,7 +4938,7 @@
                                           </p:stCondLst>
                                         </p:cTn>
                                         <p:tgtEl>
-                                          <p:spTgt spid="22"/>
+                                          <p:spTgt spid="84"/>
                                         </p:tgtEl>
                                         <p:attrNameLst>
                                           <p:attrName>style.visibility</p:attrName>
@@ -5583,7 +4965,7 @@
                                           </p:stCondLst>
                                         </p:cTn>
                                         <p:tgtEl>
-                                          <p:spTgt spid="23"/>
+                                          <p:spTgt spid="32"/>
                                         </p:tgtEl>
                                         <p:attrNameLst>
                                           <p:attrName>style.visibility</p:attrName>
@@ -5610,7 +4992,7 @@
                                           </p:stCondLst>
                                         </p:cTn>
                                         <p:tgtEl>
-                                          <p:spTgt spid="24"/>
+                                          <p:spTgt spid="36"/>
                                         </p:tgtEl>
                                         <p:attrNameLst>
                                           <p:attrName>style.visibility</p:attrName>
@@ -5637,7 +5019,7 @@
                                           </p:stCondLst>
                                         </p:cTn>
                                         <p:tgtEl>
-                                          <p:spTgt spid="29"/>
+                                          <p:spTgt spid="39"/>
                                         </p:tgtEl>
                                         <p:attrNameLst>
                                           <p:attrName>style.visibility</p:attrName>
@@ -5664,7 +5046,7 @@
                                           </p:stCondLst>
                                         </p:cTn>
                                         <p:tgtEl>
-                                          <p:spTgt spid="30"/>
+                                          <p:spTgt spid="53"/>
                                         </p:tgtEl>
                                         <p:attrNameLst>
                                           <p:attrName>style.visibility</p:attrName>
@@ -5678,7 +5060,7 @@
                                 </p:cTn>
                               </p:par>
                               <p:par>
-                                <p:cTn id="35" presetID="1" presetClass="entr" presetSubtype="0" fill="hold" grpId="0" nodeType="withEffect">
+                                <p:cTn id="35" presetID="1" presetClass="entr" presetSubtype="0" fill="hold" nodeType="withEffect">
                                   <p:stCondLst>
                                     <p:cond delay="0"/>
                                   </p:stCondLst>
@@ -5691,7 +5073,7 @@
                                           </p:stCondLst>
                                         </p:cTn>
                                         <p:tgtEl>
-                                          <p:spTgt spid="31"/>
+                                          <p:spTgt spid="56"/>
                                         </p:tgtEl>
                                         <p:attrNameLst>
                                           <p:attrName>style.visibility</p:attrName>
@@ -5705,7 +5087,7 @@
                                 </p:cTn>
                               </p:par>
                               <p:par>
-                                <p:cTn id="37" presetID="1" presetClass="entr" presetSubtype="0" fill="hold" grpId="0" nodeType="withEffect">
+                                <p:cTn id="37" presetID="1" presetClass="entr" presetSubtype="0" fill="hold" nodeType="withEffect">
                                   <p:stCondLst>
                                     <p:cond delay="0"/>
                                   </p:stCondLst>
@@ -5718,7 +5100,7 @@
                                           </p:stCondLst>
                                         </p:cTn>
                                         <p:tgtEl>
-                                          <p:spTgt spid="32"/>
+                                          <p:spTgt spid="60"/>
                                         </p:tgtEl>
                                         <p:attrNameLst>
                                           <p:attrName>style.visibility</p:attrName>
@@ -5732,7 +5114,7 @@
                                 </p:cTn>
                               </p:par>
                               <p:par>
-                                <p:cTn id="39" presetID="1" presetClass="entr" presetSubtype="0" fill="hold" grpId="0" nodeType="withEffect">
+                                <p:cTn id="39" presetID="1" presetClass="entr" presetSubtype="0" fill="hold" nodeType="withEffect">
                                   <p:stCondLst>
                                     <p:cond delay="0"/>
                                   </p:stCondLst>
@@ -5745,7 +5127,7 @@
                                           </p:stCondLst>
                                         </p:cTn>
                                         <p:tgtEl>
-                                          <p:spTgt spid="37"/>
+                                          <p:spTgt spid="72"/>
                                         </p:tgtEl>
                                         <p:attrNameLst>
                                           <p:attrName>style.visibility</p:attrName>
@@ -5759,7 +5141,7 @@
                                 </p:cTn>
                               </p:par>
                               <p:par>
-                                <p:cTn id="41" presetID="1" presetClass="entr" presetSubtype="0" fill="hold" grpId="0" nodeType="withEffect">
+                                <p:cTn id="41" presetID="1" presetClass="entr" presetSubtype="0" fill="hold" nodeType="withEffect">
                                   <p:stCondLst>
                                     <p:cond delay="0"/>
                                   </p:stCondLst>
@@ -5772,7 +5154,7 @@
                                           </p:stCondLst>
                                         </p:cTn>
                                         <p:tgtEl>
-                                          <p:spTgt spid="38"/>
+                                          <p:spTgt spid="75"/>
                                         </p:tgtEl>
                                         <p:attrNameLst>
                                           <p:attrName>style.visibility</p:attrName>
@@ -5786,7 +5168,7 @@
                                 </p:cTn>
                               </p:par>
                               <p:par>
-                                <p:cTn id="43" presetID="1" presetClass="entr" presetSubtype="0" fill="hold" grpId="0" nodeType="withEffect">
+                                <p:cTn id="43" presetID="1" presetClass="entr" presetSubtype="0" fill="hold" nodeType="withEffect">
                                   <p:stCondLst>
                                     <p:cond delay="0"/>
                                   </p:stCondLst>
@@ -5794,393 +5176,6 @@
                                     <p:set>
                                       <p:cBhvr>
                                         <p:cTn id="44" dur="1" fill="hold">
-                                          <p:stCondLst>
-                                            <p:cond delay="0"/>
-                                          </p:stCondLst>
-                                        </p:cTn>
-                                        <p:tgtEl>
-                                          <p:spTgt spid="39"/>
-                                        </p:tgtEl>
-                                        <p:attrNameLst>
-                                          <p:attrName>style.visibility</p:attrName>
-                                        </p:attrNameLst>
-                                      </p:cBhvr>
-                                      <p:to>
-                                        <p:strVal val="visible"/>
-                                      </p:to>
-                                    </p:set>
-                                  </p:childTnLst>
-                                </p:cTn>
-                              </p:par>
-                              <p:par>
-                                <p:cTn id="45" presetID="1" presetClass="entr" presetSubtype="0" fill="hold" grpId="0" nodeType="withEffect">
-                                  <p:stCondLst>
-                                    <p:cond delay="0"/>
-                                  </p:stCondLst>
-                                  <p:childTnLst>
-                                    <p:set>
-                                      <p:cBhvr>
-                                        <p:cTn id="46" dur="1" fill="hold">
-                                          <p:stCondLst>
-                                            <p:cond delay="0"/>
-                                          </p:stCondLst>
-                                        </p:cTn>
-                                        <p:tgtEl>
-                                          <p:spTgt spid="40"/>
-                                        </p:tgtEl>
-                                        <p:attrNameLst>
-                                          <p:attrName>style.visibility</p:attrName>
-                                        </p:attrNameLst>
-                                      </p:cBhvr>
-                                      <p:to>
-                                        <p:strVal val="visible"/>
-                                      </p:to>
-                                    </p:set>
-                                  </p:childTnLst>
-                                </p:cTn>
-                              </p:par>
-                              <p:par>
-                                <p:cTn id="47" presetID="1" presetClass="entr" presetSubtype="0" fill="hold" grpId="0" nodeType="withEffect">
-                                  <p:stCondLst>
-                                    <p:cond delay="0"/>
-                                  </p:stCondLst>
-                                  <p:childTnLst>
-                                    <p:set>
-                                      <p:cBhvr>
-                                        <p:cTn id="48" dur="1" fill="hold">
-                                          <p:stCondLst>
-                                            <p:cond delay="0"/>
-                                          </p:stCondLst>
-                                        </p:cTn>
-                                        <p:tgtEl>
-                                          <p:spTgt spid="41"/>
-                                        </p:tgtEl>
-                                        <p:attrNameLst>
-                                          <p:attrName>style.visibility</p:attrName>
-                                        </p:attrNameLst>
-                                      </p:cBhvr>
-                                      <p:to>
-                                        <p:strVal val="visible"/>
-                                      </p:to>
-                                    </p:set>
-                                  </p:childTnLst>
-                                </p:cTn>
-                              </p:par>
-                              <p:par>
-                                <p:cTn id="49" presetID="1" presetClass="entr" presetSubtype="0" fill="hold" grpId="0" nodeType="withEffect">
-                                  <p:stCondLst>
-                                    <p:cond delay="0"/>
-                                  </p:stCondLst>
-                                  <p:childTnLst>
-                                    <p:set>
-                                      <p:cBhvr>
-                                        <p:cTn id="50" dur="1" fill="hold">
-                                          <p:stCondLst>
-                                            <p:cond delay="0"/>
-                                          </p:stCondLst>
-                                        </p:cTn>
-                                        <p:tgtEl>
-                                          <p:spTgt spid="42"/>
-                                        </p:tgtEl>
-                                        <p:attrNameLst>
-                                          <p:attrName>style.visibility</p:attrName>
-                                        </p:attrNameLst>
-                                      </p:cBhvr>
-                                      <p:to>
-                                        <p:strVal val="visible"/>
-                                      </p:to>
-                                    </p:set>
-                                  </p:childTnLst>
-                                </p:cTn>
-                              </p:par>
-                              <p:par>
-                                <p:cTn id="51" presetID="1" presetClass="entr" presetSubtype="0" fill="hold" grpId="0" nodeType="withEffect">
-                                  <p:stCondLst>
-                                    <p:cond delay="0"/>
-                                  </p:stCondLst>
-                                  <p:childTnLst>
-                                    <p:set>
-                                      <p:cBhvr>
-                                        <p:cTn id="52" dur="1" fill="hold">
-                                          <p:stCondLst>
-                                            <p:cond delay="0"/>
-                                          </p:stCondLst>
-                                        </p:cTn>
-                                        <p:tgtEl>
-                                          <p:spTgt spid="43"/>
-                                        </p:tgtEl>
-                                        <p:attrNameLst>
-                                          <p:attrName>style.visibility</p:attrName>
-                                        </p:attrNameLst>
-                                      </p:cBhvr>
-                                      <p:to>
-                                        <p:strVal val="visible"/>
-                                      </p:to>
-                                    </p:set>
-                                  </p:childTnLst>
-                                </p:cTn>
-                              </p:par>
-                              <p:par>
-                                <p:cTn id="53" presetID="1" presetClass="entr" presetSubtype="0" fill="hold" grpId="0" nodeType="withEffect">
-                                  <p:stCondLst>
-                                    <p:cond delay="0"/>
-                                  </p:stCondLst>
-                                  <p:childTnLst>
-                                    <p:set>
-                                      <p:cBhvr>
-                                        <p:cTn id="54" dur="1" fill="hold">
-                                          <p:stCondLst>
-                                            <p:cond delay="0"/>
-                                          </p:stCondLst>
-                                        </p:cTn>
-                                        <p:tgtEl>
-                                          <p:spTgt spid="48"/>
-                                        </p:tgtEl>
-                                        <p:attrNameLst>
-                                          <p:attrName>style.visibility</p:attrName>
-                                        </p:attrNameLst>
-                                      </p:cBhvr>
-                                      <p:to>
-                                        <p:strVal val="visible"/>
-                                      </p:to>
-                                    </p:set>
-                                  </p:childTnLst>
-                                </p:cTn>
-                              </p:par>
-                              <p:par>
-                                <p:cTn id="55" presetID="1" presetClass="entr" presetSubtype="0" fill="hold" grpId="0" nodeType="withEffect">
-                                  <p:stCondLst>
-                                    <p:cond delay="0"/>
-                                  </p:stCondLst>
-                                  <p:childTnLst>
-                                    <p:set>
-                                      <p:cBhvr>
-                                        <p:cTn id="56" dur="1" fill="hold">
-                                          <p:stCondLst>
-                                            <p:cond delay="0"/>
-                                          </p:stCondLst>
-                                        </p:cTn>
-                                        <p:tgtEl>
-                                          <p:spTgt spid="49"/>
-                                        </p:tgtEl>
-                                        <p:attrNameLst>
-                                          <p:attrName>style.visibility</p:attrName>
-                                        </p:attrNameLst>
-                                      </p:cBhvr>
-                                      <p:to>
-                                        <p:strVal val="visible"/>
-                                      </p:to>
-                                    </p:set>
-                                  </p:childTnLst>
-                                </p:cTn>
-                              </p:par>
-                            </p:childTnLst>
-                          </p:cTn>
-                        </p:par>
-                      </p:childTnLst>
-                    </p:cTn>
-                  </p:par>
-                  <p:par>
-                    <p:cTn id="57" fill="hold">
-                      <p:stCondLst>
-                        <p:cond delay="indefinite"/>
-                      </p:stCondLst>
-                      <p:childTnLst>
-                        <p:par>
-                          <p:cTn id="58" fill="hold">
-                            <p:stCondLst>
-                              <p:cond delay="0"/>
-                            </p:stCondLst>
-                            <p:childTnLst>
-                              <p:par>
-                                <p:cTn id="59" presetID="1" presetClass="entr" presetSubtype="0" fill="hold" grpId="0" nodeType="clickEffect">
-                                  <p:stCondLst>
-                                    <p:cond delay="0"/>
-                                  </p:stCondLst>
-                                  <p:childTnLst>
-                                    <p:set>
-                                      <p:cBhvr>
-                                        <p:cTn id="60" dur="1" fill="hold">
-                                          <p:stCondLst>
-                                            <p:cond delay="0"/>
-                                          </p:stCondLst>
-                                        </p:cTn>
-                                        <p:tgtEl>
-                                          <p:spTgt spid="50"/>
-                                        </p:tgtEl>
-                                        <p:attrNameLst>
-                                          <p:attrName>style.visibility</p:attrName>
-                                        </p:attrNameLst>
-                                      </p:cBhvr>
-                                      <p:to>
-                                        <p:strVal val="visible"/>
-                                      </p:to>
-                                    </p:set>
-                                  </p:childTnLst>
-                                </p:cTn>
-                              </p:par>
-                            </p:childTnLst>
-                          </p:cTn>
-                        </p:par>
-                      </p:childTnLst>
-                    </p:cTn>
-                  </p:par>
-                  <p:par>
-                    <p:cTn id="61" fill="hold">
-                      <p:stCondLst>
-                        <p:cond delay="indefinite"/>
-                      </p:stCondLst>
-                      <p:childTnLst>
-                        <p:par>
-                          <p:cTn id="62" fill="hold">
-                            <p:stCondLst>
-                              <p:cond delay="0"/>
-                            </p:stCondLst>
-                            <p:childTnLst>
-                              <p:par>
-                                <p:cTn id="63" presetID="1" presetClass="entr" presetSubtype="0" fill="hold" grpId="0" nodeType="clickEffect">
-                                  <p:stCondLst>
-                                    <p:cond delay="0"/>
-                                  </p:stCondLst>
-                                  <p:childTnLst>
-                                    <p:set>
-                                      <p:cBhvr>
-                                        <p:cTn id="64" dur="1" fill="hold">
-                                          <p:stCondLst>
-                                            <p:cond delay="0"/>
-                                          </p:stCondLst>
-                                        </p:cTn>
-                                        <p:tgtEl>
-                                          <p:spTgt spid="78"/>
-                                        </p:tgtEl>
-                                        <p:attrNameLst>
-                                          <p:attrName>style.visibility</p:attrName>
-                                        </p:attrNameLst>
-                                      </p:cBhvr>
-                                      <p:to>
-                                        <p:strVal val="visible"/>
-                                      </p:to>
-                                    </p:set>
-                                  </p:childTnLst>
-                                </p:cTn>
-                              </p:par>
-                            </p:childTnLst>
-                          </p:cTn>
-                        </p:par>
-                      </p:childTnLst>
-                    </p:cTn>
-                  </p:par>
-                  <p:par>
-                    <p:cTn id="65" fill="hold">
-                      <p:stCondLst>
-                        <p:cond delay="indefinite"/>
-                      </p:stCondLst>
-                      <p:childTnLst>
-                        <p:par>
-                          <p:cTn id="66" fill="hold">
-                            <p:stCondLst>
-                              <p:cond delay="0"/>
-                            </p:stCondLst>
-                            <p:childTnLst>
-                              <p:par>
-                                <p:cTn id="67" presetID="1" presetClass="entr" presetSubtype="0" fill="hold" grpId="0" nodeType="clickEffect">
-                                  <p:stCondLst>
-                                    <p:cond delay="0"/>
-                                  </p:stCondLst>
-                                  <p:childTnLst>
-                                    <p:set>
-                                      <p:cBhvr>
-                                        <p:cTn id="68" dur="1" fill="hold">
-                                          <p:stCondLst>
-                                            <p:cond delay="0"/>
-                                          </p:stCondLst>
-                                        </p:cTn>
-                                        <p:tgtEl>
-                                          <p:spTgt spid="79"/>
-                                        </p:tgtEl>
-                                        <p:attrNameLst>
-                                          <p:attrName>style.visibility</p:attrName>
-                                        </p:attrNameLst>
-                                      </p:cBhvr>
-                                      <p:to>
-                                        <p:strVal val="visible"/>
-                                      </p:to>
-                                    </p:set>
-                                  </p:childTnLst>
-                                </p:cTn>
-                              </p:par>
-                            </p:childTnLst>
-                          </p:cTn>
-                        </p:par>
-                      </p:childTnLst>
-                    </p:cTn>
-                  </p:par>
-                  <p:par>
-                    <p:cTn id="69" fill="hold">
-                      <p:stCondLst>
-                        <p:cond delay="indefinite"/>
-                      </p:stCondLst>
-                      <p:childTnLst>
-                        <p:par>
-                          <p:cTn id="70" fill="hold">
-                            <p:stCondLst>
-                              <p:cond delay="0"/>
-                            </p:stCondLst>
-                            <p:childTnLst>
-                              <p:par>
-                                <p:cTn id="71" presetID="1" presetClass="entr" presetSubtype="0" fill="hold" grpId="0" nodeType="clickEffect">
-                                  <p:stCondLst>
-                                    <p:cond delay="0"/>
-                                  </p:stCondLst>
-                                  <p:childTnLst>
-                                    <p:set>
-                                      <p:cBhvr>
-                                        <p:cTn id="72" dur="1" fill="hold">
-                                          <p:stCondLst>
-                                            <p:cond delay="0"/>
-                                          </p:stCondLst>
-                                        </p:cTn>
-                                        <p:tgtEl>
-                                          <p:spTgt spid="80"/>
-                                        </p:tgtEl>
-                                        <p:attrNameLst>
-                                          <p:attrName>style.visibility</p:attrName>
-                                        </p:attrNameLst>
-                                      </p:cBhvr>
-                                      <p:to>
-                                        <p:strVal val="visible"/>
-                                      </p:to>
-                                    </p:set>
-                                  </p:childTnLst>
-                                </p:cTn>
-                              </p:par>
-                            </p:childTnLst>
-                          </p:cTn>
-                        </p:par>
-                      </p:childTnLst>
-                    </p:cTn>
-                  </p:par>
-                  <p:par>
-                    <p:cTn id="73" fill="hold">
-                      <p:stCondLst>
-                        <p:cond delay="indefinite"/>
-                      </p:stCondLst>
-                      <p:childTnLst>
-                        <p:par>
-                          <p:cTn id="74" fill="hold">
-                            <p:stCondLst>
-                              <p:cond delay="0"/>
-                            </p:stCondLst>
-                            <p:childTnLst>
-                              <p:par>
-                                <p:cTn id="75" presetID="1" presetClass="entr" presetSubtype="0" fill="hold" grpId="0" nodeType="clickEffect">
-                                  <p:stCondLst>
-                                    <p:cond delay="0"/>
-                                  </p:stCondLst>
-                                  <p:childTnLst>
-                                    <p:set>
-                                      <p:cBhvr>
-                                        <p:cTn id="76" dur="1" fill="hold">
                                           <p:stCondLst>
                                             <p:cond delay="0"/>
                                           </p:stCondLst>
@@ -6199,78 +5194,15 @@
                                   </p:childTnLst>
                                 </p:cTn>
                               </p:par>
-                            </p:childTnLst>
-                          </p:cTn>
-                        </p:par>
-                      </p:childTnLst>
-                    </p:cTn>
-                  </p:par>
-                  <p:par>
-                    <p:cTn id="77" fill="hold">
-                      <p:stCondLst>
-                        <p:cond delay="indefinite"/>
-                      </p:stCondLst>
-                      <p:childTnLst>
-                        <p:par>
-                          <p:cTn id="78" fill="hold">
-                            <p:stCondLst>
-                              <p:cond delay="0"/>
-                            </p:stCondLst>
-                            <p:childTnLst>
                               <p:par>
-                                <p:cTn id="79" presetID="1" presetClass="entr" presetSubtype="0" fill="hold" grpId="0" nodeType="clickEffect">
+                                <p:cTn id="45" presetID="1" presetClass="entr" presetSubtype="0" fill="hold" nodeType="withEffect">
                                   <p:stCondLst>
                                     <p:cond delay="0"/>
                                   </p:stCondLst>
                                   <p:childTnLst>
                                     <p:set>
                                       <p:cBhvr>
-                                        <p:cTn id="80" dur="1" fill="hold">
-                                          <p:stCondLst>
-                                            <p:cond delay="0"/>
-                                          </p:stCondLst>
-                                        </p:cTn>
-                                        <p:tgtEl>
-                                          <p:spTgt spid="82"/>
-                                        </p:tgtEl>
-                                        <p:attrNameLst>
-                                          <p:attrName>style.visibility</p:attrName>
-                                        </p:attrNameLst>
-                                      </p:cBhvr>
-                                      <p:to>
-                                        <p:strVal val="visible"/>
-                                      </p:to>
-                                    </p:set>
-                                  </p:childTnLst>
-                                </p:cTn>
-                              </p:par>
-                            </p:childTnLst>
-                          </p:cTn>
-                        </p:par>
-                      </p:childTnLst>
-                    </p:cTn>
-                  </p:par>
-                  <p:par>
-                    <p:cTn id="81" fill="hold">
-                      <p:stCondLst>
-                        <p:cond delay="indefinite"/>
-                      </p:stCondLst>
-                      <p:childTnLst>
-                        <p:par>
-                          <p:cTn id="82" fill="hold">
-                            <p:stCondLst>
-                              <p:cond delay="0"/>
-                            </p:stCondLst>
-                            <p:childTnLst>
-                              <p:par>
-                                <p:cTn id="83" presetID="1" presetClass="entr" presetSubtype="0" fill="hold" grpId="0" nodeType="clickEffect">
-                                  <p:stCondLst>
-                                    <p:cond delay="0"/>
-                                  </p:stCondLst>
-                                  <p:childTnLst>
-                                    <p:set>
-                                      <p:cBhvr>
-                                        <p:cTn id="84" dur="1" fill="hold">
+                                        <p:cTn id="46" dur="1" fill="hold">
                                           <p:stCondLst>
                                             <p:cond delay="0"/>
                                           </p:stCondLst>
@@ -6289,39 +5221,372 @@
                                   </p:childTnLst>
                                 </p:cTn>
                               </p:par>
-                            </p:childTnLst>
-                          </p:cTn>
-                        </p:par>
-                      </p:childTnLst>
-                    </p:cTn>
-                  </p:par>
-                  <p:par>
-                    <p:cTn id="85" fill="hold">
-                      <p:stCondLst>
-                        <p:cond delay="indefinite"/>
-                      </p:stCondLst>
-                      <p:childTnLst>
-                        <p:par>
-                          <p:cTn id="86" fill="hold">
-                            <p:stCondLst>
-                              <p:cond delay="0"/>
-                            </p:stCondLst>
-                            <p:childTnLst>
                               <p:par>
-                                <p:cTn id="87" presetID="1" presetClass="entr" presetSubtype="0" fill="hold" grpId="0" nodeType="clickEffect">
+                                <p:cTn id="47" presetID="1" presetClass="entr" presetSubtype="0" fill="hold" nodeType="withEffect">
                                   <p:stCondLst>
                                     <p:cond delay="0"/>
                                   </p:stCondLst>
                                   <p:childTnLst>
                                     <p:set>
                                       <p:cBhvr>
-                                        <p:cTn id="88" dur="1" fill="hold">
+                                        <p:cTn id="48" dur="1" fill="hold">
                                           <p:stCondLst>
                                             <p:cond delay="0"/>
                                           </p:stCondLst>
                                         </p:cTn>
                                         <p:tgtEl>
-                                          <p:spTgt spid="84"/>
+                                          <p:spTgt spid="88"/>
+                                        </p:tgtEl>
+                                        <p:attrNameLst>
+                                          <p:attrName>style.visibility</p:attrName>
+                                        </p:attrNameLst>
+                                      </p:cBhvr>
+                                      <p:to>
+                                        <p:strVal val="visible"/>
+                                      </p:to>
+                                    </p:set>
+                                  </p:childTnLst>
+                                </p:cTn>
+                              </p:par>
+                              <p:par>
+                                <p:cTn id="49" presetID="1" presetClass="entr" presetSubtype="0" fill="hold" nodeType="withEffect">
+                                  <p:stCondLst>
+                                    <p:cond delay="0"/>
+                                  </p:stCondLst>
+                                  <p:childTnLst>
+                                    <p:set>
+                                      <p:cBhvr>
+                                        <p:cTn id="50" dur="1" fill="hold">
+                                          <p:stCondLst>
+                                            <p:cond delay="0"/>
+                                          </p:stCondLst>
+                                        </p:cTn>
+                                        <p:tgtEl>
+                                          <p:spTgt spid="89"/>
+                                        </p:tgtEl>
+                                        <p:attrNameLst>
+                                          <p:attrName>style.visibility</p:attrName>
+                                        </p:attrNameLst>
+                                      </p:cBhvr>
+                                      <p:to>
+                                        <p:strVal val="visible"/>
+                                      </p:to>
+                                    </p:set>
+                                  </p:childTnLst>
+                                </p:cTn>
+                              </p:par>
+                              <p:par>
+                                <p:cTn id="51" presetID="1" presetClass="entr" presetSubtype="0" fill="hold" nodeType="withEffect">
+                                  <p:stCondLst>
+                                    <p:cond delay="0"/>
+                                  </p:stCondLst>
+                                  <p:childTnLst>
+                                    <p:set>
+                                      <p:cBhvr>
+                                        <p:cTn id="52" dur="1" fill="hold">
+                                          <p:stCondLst>
+                                            <p:cond delay="0"/>
+                                          </p:stCondLst>
+                                        </p:cTn>
+                                        <p:tgtEl>
+                                          <p:spTgt spid="100"/>
+                                        </p:tgtEl>
+                                        <p:attrNameLst>
+                                          <p:attrName>style.visibility</p:attrName>
+                                        </p:attrNameLst>
+                                      </p:cBhvr>
+                                      <p:to>
+                                        <p:strVal val="visible"/>
+                                      </p:to>
+                                    </p:set>
+                                  </p:childTnLst>
+                                </p:cTn>
+                              </p:par>
+                              <p:par>
+                                <p:cTn id="53" presetID="1" presetClass="entr" presetSubtype="0" fill="hold" nodeType="withEffect">
+                                  <p:stCondLst>
+                                    <p:cond delay="0"/>
+                                  </p:stCondLst>
+                                  <p:childTnLst>
+                                    <p:set>
+                                      <p:cBhvr>
+                                        <p:cTn id="54" dur="1" fill="hold">
+                                          <p:stCondLst>
+                                            <p:cond delay="0"/>
+                                          </p:stCondLst>
+                                        </p:cTn>
+                                        <p:tgtEl>
+                                          <p:spTgt spid="104"/>
+                                        </p:tgtEl>
+                                        <p:attrNameLst>
+                                          <p:attrName>style.visibility</p:attrName>
+                                        </p:attrNameLst>
+                                      </p:cBhvr>
+                                      <p:to>
+                                        <p:strVal val="visible"/>
+                                      </p:to>
+                                    </p:set>
+                                  </p:childTnLst>
+                                </p:cTn>
+                              </p:par>
+                              <p:par>
+                                <p:cTn id="55" presetID="1" presetClass="entr" presetSubtype="0" fill="hold" nodeType="withEffect">
+                                  <p:stCondLst>
+                                    <p:cond delay="0"/>
+                                  </p:stCondLst>
+                                  <p:childTnLst>
+                                    <p:set>
+                                      <p:cBhvr>
+                                        <p:cTn id="56" dur="1" fill="hold">
+                                          <p:stCondLst>
+                                            <p:cond delay="0"/>
+                                          </p:stCondLst>
+                                        </p:cTn>
+                                        <p:tgtEl>
+                                          <p:spTgt spid="109"/>
+                                        </p:tgtEl>
+                                        <p:attrNameLst>
+                                          <p:attrName>style.visibility</p:attrName>
+                                        </p:attrNameLst>
+                                      </p:cBhvr>
+                                      <p:to>
+                                        <p:strVal val="visible"/>
+                                      </p:to>
+                                    </p:set>
+                                  </p:childTnLst>
+                                </p:cTn>
+                              </p:par>
+                              <p:par>
+                                <p:cTn id="57" presetID="1" presetClass="entr" presetSubtype="0" fill="hold" nodeType="withEffect">
+                                  <p:stCondLst>
+                                    <p:cond delay="0"/>
+                                  </p:stCondLst>
+                                  <p:childTnLst>
+                                    <p:set>
+                                      <p:cBhvr>
+                                        <p:cTn id="58" dur="1" fill="hold">
+                                          <p:stCondLst>
+                                            <p:cond delay="0"/>
+                                          </p:stCondLst>
+                                        </p:cTn>
+                                        <p:tgtEl>
+                                          <p:spTgt spid="112"/>
+                                        </p:tgtEl>
+                                        <p:attrNameLst>
+                                          <p:attrName>style.visibility</p:attrName>
+                                        </p:attrNameLst>
+                                      </p:cBhvr>
+                                      <p:to>
+                                        <p:strVal val="visible"/>
+                                      </p:to>
+                                    </p:set>
+                                  </p:childTnLst>
+                                </p:cTn>
+                              </p:par>
+                              <p:par>
+                                <p:cTn id="59" presetID="1" presetClass="entr" presetSubtype="0" fill="hold" nodeType="withEffect">
+                                  <p:stCondLst>
+                                    <p:cond delay="0"/>
+                                  </p:stCondLst>
+                                  <p:childTnLst>
+                                    <p:set>
+                                      <p:cBhvr>
+                                        <p:cTn id="60" dur="1" fill="hold">
+                                          <p:stCondLst>
+                                            <p:cond delay="0"/>
+                                          </p:stCondLst>
+                                        </p:cTn>
+                                        <p:tgtEl>
+                                          <p:spTgt spid="115"/>
+                                        </p:tgtEl>
+                                        <p:attrNameLst>
+                                          <p:attrName>style.visibility</p:attrName>
+                                        </p:attrNameLst>
+                                      </p:cBhvr>
+                                      <p:to>
+                                        <p:strVal val="visible"/>
+                                      </p:to>
+                                    </p:set>
+                                  </p:childTnLst>
+                                </p:cTn>
+                              </p:par>
+                              <p:par>
+                                <p:cTn id="61" presetID="1" presetClass="entr" presetSubtype="0" fill="hold" nodeType="withEffect">
+                                  <p:stCondLst>
+                                    <p:cond delay="0"/>
+                                  </p:stCondLst>
+                                  <p:childTnLst>
+                                    <p:set>
+                                      <p:cBhvr>
+                                        <p:cTn id="62" dur="1" fill="hold">
+                                          <p:stCondLst>
+                                            <p:cond delay="0"/>
+                                          </p:stCondLst>
+                                        </p:cTn>
+                                        <p:tgtEl>
+                                          <p:spTgt spid="118"/>
+                                        </p:tgtEl>
+                                        <p:attrNameLst>
+                                          <p:attrName>style.visibility</p:attrName>
+                                        </p:attrNameLst>
+                                      </p:cBhvr>
+                                      <p:to>
+                                        <p:strVal val="visible"/>
+                                      </p:to>
+                                    </p:set>
+                                  </p:childTnLst>
+                                </p:cTn>
+                              </p:par>
+                              <p:par>
+                                <p:cTn id="63" presetID="1" presetClass="entr" presetSubtype="0" fill="hold" nodeType="withEffect">
+                                  <p:stCondLst>
+                                    <p:cond delay="0"/>
+                                  </p:stCondLst>
+                                  <p:childTnLst>
+                                    <p:set>
+                                      <p:cBhvr>
+                                        <p:cTn id="64" dur="1" fill="hold">
+                                          <p:stCondLst>
+                                            <p:cond delay="0"/>
+                                          </p:stCondLst>
+                                        </p:cTn>
+                                        <p:tgtEl>
+                                          <p:spTgt spid="122"/>
+                                        </p:tgtEl>
+                                        <p:attrNameLst>
+                                          <p:attrName>style.visibility</p:attrName>
+                                        </p:attrNameLst>
+                                      </p:cBhvr>
+                                      <p:to>
+                                        <p:strVal val="visible"/>
+                                      </p:to>
+                                    </p:set>
+                                  </p:childTnLst>
+                                </p:cTn>
+                              </p:par>
+                              <p:par>
+                                <p:cTn id="65" presetID="1" presetClass="entr" presetSubtype="0" fill="hold" nodeType="withEffect">
+                                  <p:stCondLst>
+                                    <p:cond delay="0"/>
+                                  </p:stCondLst>
+                                  <p:childTnLst>
+                                    <p:set>
+                                      <p:cBhvr>
+                                        <p:cTn id="66" dur="1" fill="hold">
+                                          <p:stCondLst>
+                                            <p:cond delay="0"/>
+                                          </p:stCondLst>
+                                        </p:cTn>
+                                        <p:tgtEl>
+                                          <p:spTgt spid="140"/>
+                                        </p:tgtEl>
+                                        <p:attrNameLst>
+                                          <p:attrName>style.visibility</p:attrName>
+                                        </p:attrNameLst>
+                                      </p:cBhvr>
+                                      <p:to>
+                                        <p:strVal val="visible"/>
+                                      </p:to>
+                                    </p:set>
+                                  </p:childTnLst>
+                                </p:cTn>
+                              </p:par>
+                              <p:par>
+                                <p:cTn id="67" presetID="1" presetClass="entr" presetSubtype="0" fill="hold" nodeType="withEffect">
+                                  <p:stCondLst>
+                                    <p:cond delay="0"/>
+                                  </p:stCondLst>
+                                  <p:childTnLst>
+                                    <p:set>
+                                      <p:cBhvr>
+                                        <p:cTn id="68" dur="1" fill="hold">
+                                          <p:stCondLst>
+                                            <p:cond delay="0"/>
+                                          </p:stCondLst>
+                                        </p:cTn>
+                                        <p:tgtEl>
+                                          <p:spTgt spid="143"/>
+                                        </p:tgtEl>
+                                        <p:attrNameLst>
+                                          <p:attrName>style.visibility</p:attrName>
+                                        </p:attrNameLst>
+                                      </p:cBhvr>
+                                      <p:to>
+                                        <p:strVal val="visible"/>
+                                      </p:to>
+                                    </p:set>
+                                  </p:childTnLst>
+                                </p:cTn>
+                              </p:par>
+                              <p:par>
+                                <p:cTn id="69" presetID="1" presetClass="entr" presetSubtype="0" fill="hold" nodeType="withEffect">
+                                  <p:stCondLst>
+                                    <p:cond delay="0"/>
+                                  </p:stCondLst>
+                                  <p:childTnLst>
+                                    <p:set>
+                                      <p:cBhvr>
+                                        <p:cTn id="70" dur="1" fill="hold">
+                                          <p:stCondLst>
+                                            <p:cond delay="0"/>
+                                          </p:stCondLst>
+                                        </p:cTn>
+                                        <p:tgtEl>
+                                          <p:spTgt spid="154"/>
+                                        </p:tgtEl>
+                                        <p:attrNameLst>
+                                          <p:attrName>style.visibility</p:attrName>
+                                        </p:attrNameLst>
+                                      </p:cBhvr>
+                                      <p:to>
+                                        <p:strVal val="visible"/>
+                                      </p:to>
+                                    </p:set>
+                                  </p:childTnLst>
+                                </p:cTn>
+                              </p:par>
+                              <p:par>
+                                <p:cTn id="71" presetID="1" presetClass="entr" presetSubtype="0" fill="hold" nodeType="withEffect">
+                                  <p:stCondLst>
+                                    <p:cond delay="0"/>
+                                  </p:stCondLst>
+                                  <p:childTnLst>
+                                    <p:set>
+                                      <p:cBhvr>
+                                        <p:cTn id="72" dur="1" fill="hold">
+                                          <p:stCondLst>
+                                            <p:cond delay="0"/>
+                                          </p:stCondLst>
+                                        </p:cTn>
+                                        <p:tgtEl>
+                                          <p:spTgt spid="158"/>
+                                        </p:tgtEl>
+                                        <p:attrNameLst>
+                                          <p:attrName>style.visibility</p:attrName>
+                                        </p:attrNameLst>
+                                      </p:cBhvr>
+                                      <p:to>
+                                        <p:strVal val="visible"/>
+                                      </p:to>
+                                    </p:set>
+                                  </p:childTnLst>
+                                </p:cTn>
+                              </p:par>
+                              <p:par>
+                                <p:cTn id="73" presetID="1" presetClass="entr" presetSubtype="0" fill="hold" nodeType="withEffect">
+                                  <p:stCondLst>
+                                    <p:cond delay="0"/>
+                                  </p:stCondLst>
+                                  <p:childTnLst>
+                                    <p:set>
+                                      <p:cBhvr>
+                                        <p:cTn id="74" dur="1" fill="hold">
+                                          <p:stCondLst>
+                                            <p:cond delay="0"/>
+                                          </p:stCondLst>
+                                        </p:cTn>
+                                        <p:tgtEl>
+                                          <p:spTgt spid="162"/>
                                         </p:tgtEl>
                                         <p:attrNameLst>
                                           <p:attrName>style.visibility</p:attrName>
@@ -6362,28 +5627,11 @@
       </p:par>
     </p:tnLst>
     <p:bldLst>
-      <p:bldP spid="12" grpId="0" animBg="1"/>
-      <p:bldP spid="13" grpId="0" animBg="1"/>
-      <p:bldP spid="14" grpId="0" animBg="1"/>
-      <p:bldP spid="15" grpId="0" animBg="1"/>
-      <p:bldP spid="31" grpId="0"/>
-      <p:bldP spid="32" grpId="0"/>
-      <p:bldP spid="37" grpId="0"/>
-      <p:bldP spid="38" grpId="0"/>
-      <p:bldP spid="39" grpId="0"/>
-      <p:bldP spid="40" grpId="0"/>
-      <p:bldP spid="41" grpId="0"/>
-      <p:bldP spid="42" grpId="0"/>
-      <p:bldP spid="43" grpId="0"/>
-      <p:bldP spid="48" grpId="0"/>
-      <p:bldP spid="49" grpId="0"/>
       <p:bldP spid="50" grpId="0" animBg="1"/>
       <p:bldP spid="78" grpId="0" animBg="1"/>
       <p:bldP spid="79" grpId="0" animBg="1"/>
       <p:bldP spid="80" grpId="0" animBg="1"/>
-      <p:bldP spid="81" grpId="0" animBg="1"/>
       <p:bldP spid="82" grpId="0" animBg="1"/>
-      <p:bldP spid="83" grpId="0" animBg="1"/>
       <p:bldP spid="84" grpId="0" animBg="1"/>
     </p:bldLst>
   </p:timing>

</xml_diff>